<commit_message>
edited pptx to add more in depth explanation of some technologies
</commit_message>
<xml_diff>
--- a/Presentation/PizzaNow.pptx
+++ b/Presentation/PizzaNow.pptx
@@ -119,6 +119,11 @@
       </a:defRPr>
     </a:lvl9pPr>
   </p:defaultTextStyle>
+  <p:extLst>
+    <p:ext uri="{EFAFB233-063F-42B5-8137-9DF3F51BA10A}">
+      <p15:sldGuideLst xmlns:p15="http://schemas.microsoft.com/office/powerpoint/2012/main"/>
+    </p:ext>
+  </p:extLst>
 </p:presentation>
 </file>
 
@@ -396,7 +401,7 @@
           <a:p>
             <a:fld id="{78ABE3C1-DBE1-495D-B57B-2849774B866A}" type="datetimeFigureOut">
               <a:rPr lang="en-US" dirty="0"/>
-              <a:t>11/27/18</a:t>
+              <a:t>11/28/2018</a:t>
             </a:fld>
             <a:endParaRPr lang="en-US" dirty="0"/>
           </a:p>
@@ -805,7 +810,7 @@
           <a:p>
             <a:fld id="{446C117F-5CCF-4837-BE5F-2B92066CAFAF}" type="datetimeFigureOut">
               <a:rPr lang="en-US" dirty="0"/>
-              <a:t>11/27/18</a:t>
+              <a:t>11/28/2018</a:t>
             </a:fld>
             <a:endParaRPr lang="en-US" dirty="0"/>
           </a:p>
@@ -1136,7 +1141,7 @@
           <a:p>
             <a:fld id="{84EB90BD-B6CE-46B7-997F-7313B992CCDC}" type="datetimeFigureOut">
               <a:rPr lang="en-US" dirty="0"/>
-              <a:t>11/27/18</a:t>
+              <a:t>11/28/2018</a:t>
             </a:fld>
             <a:endParaRPr lang="en-US" dirty="0"/>
           </a:p>
@@ -1536,7 +1541,7 @@
           <a:p>
             <a:fld id="{CDB9D11F-B188-461D-B23F-39381795C052}" type="datetimeFigureOut">
               <a:rPr lang="en-US" dirty="0"/>
-              <a:t>11/27/18</a:t>
+              <a:t>11/28/2018</a:t>
             </a:fld>
             <a:endParaRPr lang="en-US" dirty="0"/>
           </a:p>
@@ -2099,7 +2104,7 @@
           <a:p>
             <a:fld id="{52E6D8D9-55A2-4063-B0F3-121F44549695}" type="datetimeFigureOut">
               <a:rPr lang="en-US" dirty="0"/>
-              <a:t>11/27/18</a:t>
+              <a:t>11/28/2018</a:t>
             </a:fld>
             <a:endParaRPr lang="en-US" dirty="0"/>
           </a:p>
@@ -2775,7 +2780,7 @@
           <a:p>
             <a:fld id="{D4B24536-994D-4021-A283-9F449C0DB509}" type="datetimeFigureOut">
               <a:rPr lang="en-US" dirty="0"/>
-              <a:t>11/27/18</a:t>
+              <a:t>11/28/2018</a:t>
             </a:fld>
             <a:endParaRPr lang="en-US" dirty="0"/>
           </a:p>
@@ -3683,7 +3688,7 @@
           <a:p>
             <a:fld id="{3CBBBB78-C96F-47B7-AB17-D852CA960AC9}" type="datetimeFigureOut">
               <a:rPr lang="en-US" dirty="0"/>
-              <a:t>11/27/18</a:t>
+              <a:t>11/28/2018</a:t>
             </a:fld>
             <a:endParaRPr lang="en-US" dirty="0"/>
           </a:p>
@@ -3991,7 +3996,7 @@
           <a:p>
             <a:fld id="{1FA3F48C-C7C6-4055-9F49-3777875E72AE}" type="datetimeFigureOut">
               <a:rPr lang="en-US" dirty="0"/>
-              <a:t>11/27/18</a:t>
+              <a:t>11/28/2018</a:t>
             </a:fld>
             <a:endParaRPr lang="en-US" dirty="0"/>
           </a:p>
@@ -4250,7 +4255,7 @@
           <a:p>
             <a:fld id="{6178E61D-D431-422C-9764-11DAFE33AB63}" type="datetimeFigureOut">
               <a:rPr lang="en-US" dirty="0"/>
-              <a:t>11/27/18</a:t>
+              <a:t>11/28/2018</a:t>
             </a:fld>
             <a:endParaRPr lang="en-US" dirty="0"/>
           </a:p>
@@ -4569,7 +4574,7 @@
           <a:p>
             <a:fld id="{12DE42F4-6EEF-4EF7-8ED4-2208F0F89A08}" type="datetimeFigureOut">
               <a:rPr lang="en-US" dirty="0"/>
-              <a:t>11/27/18</a:t>
+              <a:t>11/28/2018</a:t>
             </a:fld>
             <a:endParaRPr lang="en-US" dirty="0"/>
           </a:p>
@@ -4953,7 +4958,7 @@
           <a:p>
             <a:fld id="{30578ACC-22D6-47C1-A373-4FD133E34F3C}" type="datetimeFigureOut">
               <a:rPr lang="en-US" dirty="0"/>
-              <a:t>11/27/18</a:t>
+              <a:t>11/28/2018</a:t>
             </a:fld>
             <a:endParaRPr lang="en-US" dirty="0"/>
           </a:p>
@@ -5324,7 +5329,7 @@
           <a:p>
             <a:fld id="{4E5A6C69-6797-4E8A-BF37-F2C3751466E9}" type="datetimeFigureOut">
               <a:rPr lang="en-US" dirty="0"/>
-              <a:t>11/27/18</a:t>
+              <a:t>11/28/2018</a:t>
             </a:fld>
             <a:endParaRPr lang="en-US" dirty="0"/>
           </a:p>
@@ -5825,7 +5830,7 @@
           <a:p>
             <a:fld id="{D82014A1-A632-4878-A0D3-F52BA7563730}" type="datetimeFigureOut">
               <a:rPr lang="en-US" dirty="0"/>
-              <a:t>11/27/18</a:t>
+              <a:t>11/28/2018</a:t>
             </a:fld>
             <a:endParaRPr lang="en-US" dirty="0"/>
           </a:p>
@@ -6077,7 +6082,7 @@
           <a:p>
             <a:fld id="{CE99F462-093F-4566-844B-4C71F2739DA5}" type="datetimeFigureOut">
               <a:rPr lang="en-US" dirty="0"/>
-              <a:t>11/27/18</a:t>
+              <a:t>11/28/2018</a:t>
             </a:fld>
             <a:endParaRPr lang="en-US" dirty="0"/>
           </a:p>
@@ -6235,7 +6240,7 @@
           <a:p>
             <a:fld id="{3D24A7AC-904D-4781-85BA-7D10C17ED021}" type="datetimeFigureOut">
               <a:rPr lang="en-US" dirty="0"/>
-              <a:t>11/27/18</a:t>
+              <a:t>11/28/2018</a:t>
             </a:fld>
             <a:endParaRPr lang="en-US" dirty="0"/>
           </a:p>
@@ -6620,7 +6625,7 @@
           <a:p>
             <a:fld id="{E331444B-B92B-4E27-8C94-BB93EAF5CB18}" type="datetimeFigureOut">
               <a:rPr lang="en-US" dirty="0"/>
-              <a:t>11/27/18</a:t>
+              <a:t>11/28/2018</a:t>
             </a:fld>
             <a:endParaRPr lang="en-US" dirty="0"/>
           </a:p>
@@ -7024,7 +7029,7 @@
           <a:p>
             <a:fld id="{363EFA5E-FA76-400D-B3DC-F0BA90E6D107}" type="datetimeFigureOut">
               <a:rPr lang="en-US" dirty="0"/>
-              <a:t>11/27/18</a:t>
+              <a:t>11/28/2018</a:t>
             </a:fld>
             <a:endParaRPr lang="en-US" dirty="0"/>
           </a:p>
@@ -7263,7 +7268,7 @@
           <a:p>
             <a:fld id="{9D6E9DEC-419B-4CC5-A080-3B06BD5A8291}" type="datetimeFigureOut">
               <a:rPr lang="en-US" dirty="0"/>
-              <a:t>11/27/18</a:t>
+              <a:t>11/28/2018</a:t>
             </a:fld>
             <a:endParaRPr lang="en-US" dirty="0"/>
           </a:p>
@@ -7834,17 +7839,8 @@
               <a:rPr lang="en-US" dirty="0">
                 <a:latin typeface="Copperplate" panose="02000504000000020004" pitchFamily="2" charset="77"/>
               </a:rPr>
-              <a:t> was used in conjunction with bootstrap to aid in functionality of </a:t>
-            </a:r>
-            <a:r>
-              <a:rPr lang="en-US" dirty="0" err="1">
-                <a:latin typeface="Copperplate" panose="02000504000000020004" pitchFamily="2" charset="77"/>
-              </a:rPr>
-              <a:t>Navbar</a:t>
-            </a:r>
-            <a:endParaRPr lang="en-US" dirty="0">
-              <a:latin typeface="Copperplate" panose="02000504000000020004" pitchFamily="2" charset="77"/>
-            </a:endParaRPr>
+              <a:t> was used in conjunction with bootstrap to aid in functionality of Navbar, Layout, and general look and feel</a:t>
+            </a:r>
           </a:p>
           <a:p>
             <a:endParaRPr lang="en-US" dirty="0"/>
@@ -7944,8 +7940,29 @@
               <a:rPr lang="en-US" sz="3600" dirty="0">
                 <a:latin typeface="Copperplate" panose="02000504000000020004" pitchFamily="2" charset="77"/>
               </a:rPr>
-              <a:t>The backend is written in .NET C# Core to handle the requests and all the backend logic</a:t>
-            </a:r>
+              <a:t>The backend is written </a:t>
+            </a:r>
+            <a:r>
+              <a:rPr lang="en-US" sz="3600">
+                <a:latin typeface="Copperplate" panose="02000504000000020004" pitchFamily="2" charset="77"/>
+              </a:rPr>
+              <a:t>in C</a:t>
+            </a:r>
+            <a:r>
+              <a:rPr lang="en-US" sz="3600" dirty="0">
+                <a:latin typeface="Copperplate" panose="02000504000000020004" pitchFamily="2" charset="77"/>
+              </a:rPr>
+              <a:t># Dotnet Core to handle the requests to Google Places API and all the </a:t>
+            </a:r>
+            <a:r>
+              <a:rPr lang="en-US" sz="3600">
+                <a:latin typeface="Copperplate" panose="02000504000000020004" pitchFamily="2" charset="77"/>
+              </a:rPr>
+              <a:t>backend logic.</a:t>
+            </a:r>
+            <a:endParaRPr lang="en-US" sz="3600" dirty="0">
+              <a:latin typeface="Copperplate" panose="02000504000000020004" pitchFamily="2" charset="77"/>
+            </a:endParaRPr>
           </a:p>
           <a:p>
             <a:endParaRPr lang="en-US" dirty="0"/>
@@ -8075,43 +8092,7 @@
               <a:rPr lang="en-US" sz="2000" dirty="0">
                 <a:latin typeface="Copperplate" panose="02000504000000020004" pitchFamily="2" charset="77"/>
               </a:rPr>
-              <a:t>Jordan </a:t>
-            </a:r>
-            <a:r>
-              <a:rPr lang="en-US" sz="2000" dirty="0" err="1">
-                <a:latin typeface="Copperplate" panose="02000504000000020004" pitchFamily="2" charset="77"/>
-              </a:rPr>
-              <a:t>Liebman</a:t>
-            </a:r>
-            <a:r>
-              <a:rPr lang="en-US" sz="2000" dirty="0">
-                <a:latin typeface="Copperplate" panose="02000504000000020004" pitchFamily="2" charset="77"/>
-              </a:rPr>
-              <a:t>: Most of the backend (handling the request and setting up the proper </a:t>
-            </a:r>
-            <a:r>
-              <a:rPr lang="en-US" sz="2000" dirty="0" err="1">
-                <a:latin typeface="Copperplate" panose="02000504000000020004" pitchFamily="2" charset="77"/>
-              </a:rPr>
-              <a:t>json</a:t>
-            </a:r>
-            <a:r>
-              <a:rPr lang="en-US" sz="2000" dirty="0">
-                <a:latin typeface="Copperplate" panose="02000504000000020004" pitchFamily="2" charset="77"/>
-              </a:rPr>
-              <a:t> </a:t>
-            </a:r>
-            <a:r>
-              <a:rPr lang="en-US" sz="2000" dirty="0" err="1">
-                <a:latin typeface="Copperplate" panose="02000504000000020004" pitchFamily="2" charset="77"/>
-              </a:rPr>
-              <a:t>reponse</a:t>
-            </a:r>
-            <a:r>
-              <a:rPr lang="en-US" sz="2000" dirty="0">
-                <a:latin typeface="Copperplate" panose="02000504000000020004" pitchFamily="2" charset="77"/>
-              </a:rPr>
-              <a:t>, and doing the detail page)</a:t>
+              <a:t>Jordan Liebman: Most of the backend (handling the request to google and returning a JSON response, for a zip code request, and a place details request) also Deployment to Firebase hosting.</a:t>
             </a:r>
           </a:p>
           <a:p>
@@ -8404,7 +8385,7 @@
               <a:rPr lang="en-US" dirty="0">
                 <a:latin typeface="Copperplate" panose="02000504000000020004" pitchFamily="2" charset="77"/>
               </a:rPr>
-              <a:t>Deployment: Firebase is the way to go to get a simple app up and running super quickly, and most importantly, secure and free.</a:t>
+              <a:t>Deployment: Firebase is the way to go to get a simple app up and running super quickly, and most importantly, secure(HTTPS) and free.</a:t>
             </a:r>
           </a:p>
           <a:p>
@@ -8578,25 +8559,17 @@
               <a:rPr lang="en-US" dirty="0">
                 <a:latin typeface="Copperplate" panose="02000504000000020004" pitchFamily="2" charset="77"/>
               </a:rPr>
-              <a:t>We would also like to have working navigation in a good looking  </a:t>
-            </a:r>
-            <a:r>
-              <a:rPr lang="en-US" dirty="0" err="1">
-                <a:latin typeface="Copperplate" panose="02000504000000020004" pitchFamily="2" charset="77"/>
-              </a:rPr>
-              <a:t>navbar</a:t>
-            </a:r>
+              <a:t>We would also like to have working navigation in a good looking  navbar.</a:t>
+            </a:r>
+          </a:p>
+          <a:p>
+            <a:pPr lvl="1"/>
             <a:r>
               <a:rPr lang="en-US" dirty="0">
                 <a:latin typeface="Copperplate" panose="02000504000000020004" pitchFamily="2" charset="77"/>
               </a:rPr>
-              <a:t>.</a:t>
-            </a:r>
-          </a:p>
-          <a:p>
-            <a:endParaRPr lang="en-US" dirty="0">
-              <a:latin typeface="Copperplate" panose="02000504000000020004" pitchFamily="2" charset="77"/>
-            </a:endParaRPr>
+              <a:t>Photo references are returned in the JSON but photos were not Implemented in the front end.</a:t>
+            </a:r>
           </a:p>
           <a:p>
             <a:r>
@@ -8614,6 +8587,12 @@
               </a:rPr>
               <a:t>implement an actual map with pins of the pizza places in your area. Doing it that way would allow you to visually see the location, as well as a list.</a:t>
             </a:r>
+          </a:p>
+          <a:p>
+            <a:pPr lvl="1"/>
+            <a:endParaRPr lang="en-US" dirty="0">
+              <a:latin typeface="Copperplate" panose="02000504000000020004" pitchFamily="2" charset="77"/>
+            </a:endParaRPr>
           </a:p>
         </p:txBody>
       </p:sp>
@@ -9035,7 +9014,7 @@
               <a:rPr lang="en-US" sz="2000" dirty="0">
                 <a:latin typeface="Copperplate" panose="02000504000000020004" pitchFamily="2" charset="77"/>
               </a:rPr>
-              <a:t>A React app that uses google maps API to return a list of pizza places in your area.</a:t>
+              <a:t>A React frontend, and a C# dotnet core API that uses google maps API to return a list of pizza places in your area.</a:t>
             </a:r>
           </a:p>
           <a:p>
@@ -9534,23 +9513,23 @@
         </p:nvSpPr>
         <p:spPr>
           <a:xfrm>
-            <a:off x="816083" y="1708878"/>
-            <a:ext cx="4131522" cy="4332157"/>
-          </a:xfrm>
-        </p:spPr>
-        <p:txBody>
-          <a:bodyPr>
-            <a:normAutofit fontScale="85000" lnSpcReduction="20000"/>
+            <a:off x="816082" y="1809546"/>
+            <a:ext cx="10066775" cy="4332157"/>
+          </a:xfrm>
+        </p:spPr>
+        <p:txBody>
+          <a:bodyPr numCol="2">
+            <a:noAutofit/>
           </a:bodyPr>
           <a:lstStyle/>
           <a:p>
             <a:pPr>
               <a:lnSpc>
-                <a:spcPct val="310000"/>
+                <a:spcPct val="200000"/>
               </a:lnSpc>
             </a:pPr>
             <a:r>
-              <a:rPr lang="en-US" sz="3500" dirty="0">
+              <a:rPr lang="en-US" sz="2600" dirty="0">
                 <a:latin typeface="Copperplate" panose="02000504000000020004" pitchFamily="2" charset="77"/>
               </a:rPr>
               <a:t>React</a:t>
@@ -9559,11 +9538,11 @@
           <a:p>
             <a:pPr>
               <a:lnSpc>
-                <a:spcPct val="310000"/>
+                <a:spcPct val="200000"/>
               </a:lnSpc>
             </a:pPr>
             <a:r>
-              <a:rPr lang="en-US" sz="3500" dirty="0">
+              <a:rPr lang="en-US" sz="2600" dirty="0">
                 <a:latin typeface="Copperplate" panose="02000504000000020004" pitchFamily="2" charset="77"/>
               </a:rPr>
               <a:t>React Router</a:t>
@@ -9572,58 +9551,47 @@
           <a:p>
             <a:pPr>
               <a:lnSpc>
-                <a:spcPct val="310000"/>
+                <a:spcPct val="200000"/>
               </a:lnSpc>
             </a:pPr>
             <a:r>
-              <a:rPr lang="en-US" sz="3500" dirty="0">
+              <a:rPr lang="en-US" sz="2600" dirty="0">
                 <a:latin typeface="Copperplate" panose="02000504000000020004" pitchFamily="2" charset="77"/>
               </a:rPr>
               <a:t>Google Maps API</a:t>
             </a:r>
           </a:p>
           <a:p>
-            <a:endParaRPr lang="en-US" dirty="0"/>
-          </a:p>
-        </p:txBody>
-      </p:sp>
-      <p:sp>
-        <p:nvSpPr>
-          <p:cNvPr id="4" name="TextBox 3">
-            <a:extLst>
-              <a:ext uri="{FF2B5EF4-FFF2-40B4-BE49-F238E27FC236}">
-                <a16:creationId xmlns:a16="http://schemas.microsoft.com/office/drawing/2014/main" id="{8BED6792-CB56-7042-ABBB-C5639E1E5072}"/>
-              </a:ext>
-            </a:extLst>
-          </p:cNvPr>
-          <p:cNvSpPr txBox="1"/>
-          <p:nvPr/>
-        </p:nvSpPr>
-        <p:spPr>
-          <a:xfrm>
-            <a:off x="6340841" y="1562406"/>
-            <a:ext cx="4542017" cy="4275786"/>
-          </a:xfrm>
-          <a:prstGeom prst="rect">
-            <a:avLst/>
-          </a:prstGeom>
-          <a:noFill/>
-        </p:spPr>
-        <p:txBody>
-          <a:bodyPr wrap="square" rtlCol="0">
-            <a:spAutoFit/>
-          </a:bodyPr>
-          <a:lstStyle/>
+            <a:pPr>
+              <a:lnSpc>
+                <a:spcPct val="200000"/>
+              </a:lnSpc>
+            </a:pPr>
+            <a:r>
+              <a:rPr lang="en-US" sz="2600" dirty="0">
+                <a:latin typeface="Copperplate" panose="02000504000000020004" pitchFamily="2" charset="77"/>
+              </a:rPr>
+              <a:t>NPM</a:t>
+            </a:r>
+          </a:p>
           <a:p>
             <a:pPr marL="342900" indent="-342900">
               <a:lnSpc>
-                <a:spcPct val="300000"/>
+                <a:spcPct val="200000"/>
               </a:lnSpc>
-              <a:buFont typeface="Arial" panose="020B0604020202020204" pitchFamily="34" charset="0"/>
-              <a:buChar char="•"/>
             </a:pPr>
-            <a:r>
-              <a:rPr lang="en-US" sz="3200" dirty="0">
+            <a:endParaRPr lang="en-US" sz="2600" dirty="0">
+              <a:latin typeface="Copperplate" panose="02000504000000020004" pitchFamily="2" charset="77"/>
+            </a:endParaRPr>
+          </a:p>
+          <a:p>
+            <a:pPr marL="342900" indent="-342900">
+              <a:lnSpc>
+                <a:spcPct val="200000"/>
+              </a:lnSpc>
+            </a:pPr>
+            <a:r>
+              <a:rPr lang="en-US" sz="2600" dirty="0">
                 <a:latin typeface="Copperplate" panose="02000504000000020004" pitchFamily="2" charset="77"/>
               </a:rPr>
               <a:t>Bootstrap</a:t>
@@ -9632,25 +9600,23 @@
           <a:p>
             <a:pPr marL="342900" indent="-342900">
               <a:lnSpc>
-                <a:spcPct val="300000"/>
+                <a:spcPct val="200000"/>
               </a:lnSpc>
-              <a:buFont typeface="Arial" panose="020B0604020202020204" pitchFamily="34" charset="0"/>
-              <a:buChar char="•"/>
             </a:pPr>
             <a:r>
-              <a:rPr lang="en-US" sz="3200" dirty="0">
+              <a:rPr lang="en-US" sz="2600" dirty="0">
                 <a:latin typeface="Copperplate" panose="02000504000000020004" pitchFamily="2" charset="77"/>
               </a:rPr>
               <a:t>AWS </a:t>
             </a:r>
             <a:r>
-              <a:rPr lang="en-US" sz="3200" dirty="0" err="1">
+              <a:rPr lang="en-US" sz="2600" dirty="0" err="1">
                 <a:latin typeface="Copperplate" panose="02000504000000020004" pitchFamily="2" charset="77"/>
               </a:rPr>
               <a:t>Lamba</a:t>
             </a:r>
             <a:r>
-              <a:rPr lang="en-US" sz="3200" dirty="0">
+              <a:rPr lang="en-US" sz="2600" dirty="0">
                 <a:latin typeface="Copperplate" panose="02000504000000020004" pitchFamily="2" charset="77"/>
               </a:rPr>
               <a:t> Server</a:t>
@@ -9659,17 +9625,36 @@
           <a:p>
             <a:pPr marL="342900" indent="-342900">
               <a:lnSpc>
-                <a:spcPct val="300000"/>
+                <a:spcPct val="200000"/>
               </a:lnSpc>
-              <a:buFont typeface="Arial" panose="020B0604020202020204" pitchFamily="34" charset="0"/>
-              <a:buChar char="•"/>
             </a:pPr>
             <a:r>
-              <a:rPr lang="en-US" sz="3200" dirty="0">
+              <a:rPr lang="en-US" sz="2600" dirty="0">
                 <a:latin typeface="Copperplate" panose="02000504000000020004" pitchFamily="2" charset="77"/>
               </a:rPr>
               <a:t>C# .NET CORE</a:t>
             </a:r>
+          </a:p>
+          <a:p>
+            <a:pPr marL="342900" indent="-342900">
+              <a:lnSpc>
+                <a:spcPct val="200000"/>
+              </a:lnSpc>
+            </a:pPr>
+            <a:r>
+              <a:rPr lang="en-US" sz="2600" dirty="0">
+                <a:latin typeface="Copperplate" panose="02000504000000020004" pitchFamily="2" charset="77"/>
+              </a:rPr>
+              <a:t>Firebase Hosting</a:t>
+            </a:r>
+          </a:p>
+          <a:p>
+            <a:pPr>
+              <a:lnSpc>
+                <a:spcPct val="200000"/>
+              </a:lnSpc>
+            </a:pPr>
+            <a:endParaRPr lang="en-US" sz="2600" dirty="0"/>
           </a:p>
         </p:txBody>
       </p:sp>
@@ -9784,7 +9769,7 @@
               <a:rPr lang="en-US" sz="3600" dirty="0">
                 <a:latin typeface="Copperplate" panose="02000504000000020004" pitchFamily="2" charset="77"/>
               </a:rPr>
-              <a:t>React was used for all of the basic functionality. We heavily relied on the </a:t>
+              <a:t>React was used for all of the basic functionality of the front end. We heavily relied on the </a:t>
             </a:r>
             <a:r>
               <a:rPr lang="en-US" sz="3600" dirty="0" err="1">
@@ -9808,25 +9793,13 @@
                 </a:solidFill>
                 <a:latin typeface="Copperplate" panose="02000504000000020004" pitchFamily="2" charset="77"/>
               </a:rPr>
-              <a:t>() </a:t>
+              <a:t>()  </a:t>
             </a:r>
             <a:r>
               <a:rPr lang="en-US" sz="3600" dirty="0">
                 <a:latin typeface="Copperplate" panose="02000504000000020004" pitchFamily="2" charset="77"/>
               </a:rPr>
-              <a:t>function to fire off requests when the </a:t>
-            </a:r>
-            <a:r>
-              <a:rPr lang="en-US" sz="3600" dirty="0" err="1">
-                <a:latin typeface="Copperplate" panose="02000504000000020004" pitchFamily="2" charset="77"/>
-              </a:rPr>
-              <a:t>componenet</a:t>
-            </a:r>
-            <a:r>
-              <a:rPr lang="en-US" sz="3600" dirty="0">
-                <a:latin typeface="Copperplate" panose="02000504000000020004" pitchFamily="2" charset="77"/>
-              </a:rPr>
-              <a:t> mounted to get our data.</a:t>
+              <a:t>lifecycle method to fire off API requests to our C# backend.</a:t>
             </a:r>
           </a:p>
         </p:txBody>
@@ -9926,7 +9899,19 @@
               <a:rPr lang="en-US" sz="3800" dirty="0">
                 <a:latin typeface="Copperplate" panose="02000504000000020004" pitchFamily="2" charset="77"/>
               </a:rPr>
-              <a:t>React router was used for navigating between the pages and loading them. The router handled when we enter the zip code and it took us to the new page, and all the SPA navigation.</a:t>
+              <a:t>React router was used for navigating between the components linking to them simply, and with URL rewriting as a standard implementation. The router enabled us to focus on API consumption in the </a:t>
+            </a:r>
+            <a:r>
+              <a:rPr lang="en-US" sz="3800" dirty="0" err="1">
+                <a:latin typeface="Copperplate" panose="02000504000000020004" pitchFamily="2" charset="77"/>
+              </a:rPr>
+              <a:t>componentDidMount</a:t>
+            </a:r>
+            <a:r>
+              <a:rPr lang="en-US" sz="3800" dirty="0">
+                <a:latin typeface="Copperplate" panose="02000504000000020004" pitchFamily="2" charset="77"/>
+              </a:rPr>
+              <a:t>() lifecycle method (a best practice in React).</a:t>
             </a:r>
           </a:p>
           <a:p>
@@ -10029,19 +10014,7 @@
               <a:rPr lang="en-US" sz="3600" dirty="0">
                 <a:latin typeface="Copperplate" panose="02000504000000020004" pitchFamily="2" charset="77"/>
               </a:rPr>
-              <a:t>Google Maps API was used to retrieve all the data about the pizza places within a certain zip code area, and then return that in a nice JSON </a:t>
-            </a:r>
-            <a:r>
-              <a:rPr lang="en-US" sz="3600" dirty="0" err="1">
-                <a:latin typeface="Copperplate" panose="02000504000000020004" pitchFamily="2" charset="77"/>
-              </a:rPr>
-              <a:t>reponse</a:t>
-            </a:r>
-            <a:r>
-              <a:rPr lang="en-US" sz="3600" dirty="0">
-                <a:latin typeface="Copperplate" panose="02000504000000020004" pitchFamily="2" charset="77"/>
-              </a:rPr>
-              <a:t> to fill our react page.</a:t>
+              <a:t>Google Maps API was used to retrieve all the data about the pizza places within a certain zip code area, then select a single place and get more information about it. JSON is returned for use in our React application.</a:t>
             </a:r>
           </a:p>
           <a:p>
@@ -10139,7 +10112,9 @@
         </p:nvSpPr>
         <p:spPr/>
         <p:txBody>
-          <a:bodyPr/>
+          <a:bodyPr>
+            <a:normAutofit fontScale="92500" lnSpcReduction="20000"/>
+          </a:bodyPr>
           <a:lstStyle/>
           <a:p>
             <a:pPr marL="0" indent="0" algn="ctr">
@@ -10161,31 +10136,26 @@
               <a:rPr lang="en-US" sz="3600" dirty="0">
                 <a:latin typeface="Copperplate" panose="02000504000000020004" pitchFamily="2" charset="77"/>
               </a:rPr>
-              <a:t> server was used for hosting our rest </a:t>
-            </a:r>
-            <a:r>
-              <a:rPr lang="en-US" sz="3600" dirty="0" err="1">
-                <a:latin typeface="Copperplate" panose="02000504000000020004" pitchFamily="2" charset="77"/>
-              </a:rPr>
-              <a:t>api</a:t>
-            </a:r>
+              <a:t> server was used for hosting our REST API. This service allows your code to be run on amazons servers without running a server at all times. A GET request is made in the front end which amazon recognizes, spins up a server for us , runs out C# dotnet core code, and returns JSON to our front end. </a:t>
+            </a:r>
+          </a:p>
+          <a:p>
+            <a:pPr marL="0" indent="0" algn="ctr">
+              <a:buNone/>
+            </a:pPr>
+            <a:endParaRPr lang="en-US" sz="3600" dirty="0">
+              <a:latin typeface="Copperplate" panose="02000504000000020004" pitchFamily="2" charset="77"/>
+            </a:endParaRPr>
+          </a:p>
+          <a:p>
+            <a:pPr marL="0" indent="0" algn="ctr">
+              <a:buNone/>
+            </a:pPr>
             <a:r>
               <a:rPr lang="en-US" sz="3600" dirty="0">
                 <a:latin typeface="Copperplate" panose="02000504000000020004" pitchFamily="2" charset="77"/>
               </a:rPr>
-              <a:t> to hit with our requests, and to have the </a:t>
-            </a:r>
-            <a:r>
-              <a:rPr lang="en-US" sz="3600" dirty="0" err="1">
-                <a:latin typeface="Copperplate" panose="02000504000000020004" pitchFamily="2" charset="77"/>
-              </a:rPr>
-              <a:t>c#</a:t>
-            </a:r>
-            <a:r>
-              <a:rPr lang="en-US" sz="3600" dirty="0">
-                <a:latin typeface="Copperplate" panose="02000504000000020004" pitchFamily="2" charset="77"/>
-              </a:rPr>
-              <a:t> backend fire the google request and handle all the server side backend of the GET request.</a:t>
+              <a:t>This keeps us focused on writing code, not configuring servers.</a:t>
             </a:r>
           </a:p>
           <a:p>

</xml_diff>

<commit_message>
edited pres, location from browser not future work. note for postman in pres
</commit_message>
<xml_diff>
--- a/Presentation/PizzaNow.pptx
+++ b/Presentation/PizzaNow.pptx
@@ -8550,7 +8550,7 @@
               <a:rPr lang="en-US" dirty="0">
                 <a:latin typeface="Copperplate" panose="02000504000000020004" pitchFamily="2" charset="77"/>
               </a:rPr>
-              <a:t>We came very close to implementing automatic location detection. If successful app would grab users location and use it to populate the input with a default value (If location is enabled in browser). </a:t>
+              <a:t>We would like to have working navigation in a good looking  navbar.</a:t>
             </a:r>
           </a:p>
           <a:p>
@@ -8559,7 +8559,7 @@
               <a:rPr lang="en-US" dirty="0">
                 <a:latin typeface="Copperplate" panose="02000504000000020004" pitchFamily="2" charset="77"/>
               </a:rPr>
-              <a:t>We would also like to have working navigation in a good looking  navbar.</a:t>
+              <a:t>Photo references are returned in the JSON but photos were not Implemented in the front end.</a:t>
             </a:r>
           </a:p>
           <a:p>
@@ -8568,8 +8568,17 @@
               <a:rPr lang="en-US" dirty="0">
                 <a:latin typeface="Copperplate" panose="02000504000000020004" pitchFamily="2" charset="77"/>
               </a:rPr>
-              <a:t>Photo references are returned in the JSON but photos were not Implemented in the front end.</a:t>
-            </a:r>
+              <a:t>(pull up postman to look at JSON responses &amp; </a:t>
+            </a:r>
+            <a:r>
+              <a:rPr lang="en-US">
+                <a:latin typeface="Copperplate" panose="02000504000000020004" pitchFamily="2" charset="77"/>
+              </a:rPr>
+              <a:t>photo responses)</a:t>
+            </a:r>
+            <a:endParaRPr lang="en-US" dirty="0">
+              <a:latin typeface="Copperplate" panose="02000504000000020004" pitchFamily="2" charset="77"/>
+            </a:endParaRPr>
           </a:p>
           <a:p>
             <a:r>

</xml_diff>

<commit_message>
added php info to presentation and document.md
</commit_message>
<xml_diff>
--- a/Presentation/PizzaNow.pptx
+++ b/Presentation/PizzaNow.pptx
@@ -16,11 +16,12 @@
     <p:sldId id="265" r:id="rId10"/>
     <p:sldId id="264" r:id="rId11"/>
     <p:sldId id="266" r:id="rId12"/>
-    <p:sldId id="267" r:id="rId13"/>
-    <p:sldId id="270" r:id="rId14"/>
-    <p:sldId id="268" r:id="rId15"/>
-    <p:sldId id="269" r:id="rId16"/>
-    <p:sldId id="271" r:id="rId17"/>
+    <p:sldId id="272" r:id="rId13"/>
+    <p:sldId id="273" r:id="rId14"/>
+    <p:sldId id="270" r:id="rId15"/>
+    <p:sldId id="268" r:id="rId16"/>
+    <p:sldId id="269" r:id="rId17"/>
+    <p:sldId id="274" r:id="rId18"/>
   </p:sldIdLst>
   <p:sldSz cx="12192000" cy="6858000"/>
   <p:notesSz cx="6858000" cy="9144000"/>
@@ -401,7 +402,7 @@
           <a:p>
             <a:fld id="{78ABE3C1-DBE1-495D-B57B-2849774B866A}" type="datetimeFigureOut">
               <a:rPr lang="en-US" dirty="0"/>
-              <a:t>11/28/2018</a:t>
+              <a:t>11/28/18</a:t>
             </a:fld>
             <a:endParaRPr lang="en-US" dirty="0"/>
           </a:p>
@@ -810,7 +811,7 @@
           <a:p>
             <a:fld id="{446C117F-5CCF-4837-BE5F-2B92066CAFAF}" type="datetimeFigureOut">
               <a:rPr lang="en-US" dirty="0"/>
-              <a:t>11/28/2018</a:t>
+              <a:t>11/28/18</a:t>
             </a:fld>
             <a:endParaRPr lang="en-US" dirty="0"/>
           </a:p>
@@ -1141,7 +1142,7 @@
           <a:p>
             <a:fld id="{84EB90BD-B6CE-46B7-997F-7313B992CCDC}" type="datetimeFigureOut">
               <a:rPr lang="en-US" dirty="0"/>
-              <a:t>11/28/2018</a:t>
+              <a:t>11/28/18</a:t>
             </a:fld>
             <a:endParaRPr lang="en-US" dirty="0"/>
           </a:p>
@@ -1541,7 +1542,7 @@
           <a:p>
             <a:fld id="{CDB9D11F-B188-461D-B23F-39381795C052}" type="datetimeFigureOut">
               <a:rPr lang="en-US" dirty="0"/>
-              <a:t>11/28/2018</a:t>
+              <a:t>11/28/18</a:t>
             </a:fld>
             <a:endParaRPr lang="en-US" dirty="0"/>
           </a:p>
@@ -2104,7 +2105,7 @@
           <a:p>
             <a:fld id="{52E6D8D9-55A2-4063-B0F3-121F44549695}" type="datetimeFigureOut">
               <a:rPr lang="en-US" dirty="0"/>
-              <a:t>11/28/2018</a:t>
+              <a:t>11/28/18</a:t>
             </a:fld>
             <a:endParaRPr lang="en-US" dirty="0"/>
           </a:p>
@@ -2780,7 +2781,7 @@
           <a:p>
             <a:fld id="{D4B24536-994D-4021-A283-9F449C0DB509}" type="datetimeFigureOut">
               <a:rPr lang="en-US" dirty="0"/>
-              <a:t>11/28/2018</a:t>
+              <a:t>11/28/18</a:t>
             </a:fld>
             <a:endParaRPr lang="en-US" dirty="0"/>
           </a:p>
@@ -3688,7 +3689,7 @@
           <a:p>
             <a:fld id="{3CBBBB78-C96F-47B7-AB17-D852CA960AC9}" type="datetimeFigureOut">
               <a:rPr lang="en-US" dirty="0"/>
-              <a:t>11/28/2018</a:t>
+              <a:t>11/28/18</a:t>
             </a:fld>
             <a:endParaRPr lang="en-US" dirty="0"/>
           </a:p>
@@ -3996,7 +3997,7 @@
           <a:p>
             <a:fld id="{1FA3F48C-C7C6-4055-9F49-3777875E72AE}" type="datetimeFigureOut">
               <a:rPr lang="en-US" dirty="0"/>
-              <a:t>11/28/2018</a:t>
+              <a:t>11/28/18</a:t>
             </a:fld>
             <a:endParaRPr lang="en-US" dirty="0"/>
           </a:p>
@@ -4255,7 +4256,7 @@
           <a:p>
             <a:fld id="{6178E61D-D431-422C-9764-11DAFE33AB63}" type="datetimeFigureOut">
               <a:rPr lang="en-US" dirty="0"/>
-              <a:t>11/28/2018</a:t>
+              <a:t>11/28/18</a:t>
             </a:fld>
             <a:endParaRPr lang="en-US" dirty="0"/>
           </a:p>
@@ -4574,7 +4575,7 @@
           <a:p>
             <a:fld id="{12DE42F4-6EEF-4EF7-8ED4-2208F0F89A08}" type="datetimeFigureOut">
               <a:rPr lang="en-US" dirty="0"/>
-              <a:t>11/28/2018</a:t>
+              <a:t>11/28/18</a:t>
             </a:fld>
             <a:endParaRPr lang="en-US" dirty="0"/>
           </a:p>
@@ -4958,7 +4959,7 @@
           <a:p>
             <a:fld id="{30578ACC-22D6-47C1-A373-4FD133E34F3C}" type="datetimeFigureOut">
               <a:rPr lang="en-US" dirty="0"/>
-              <a:t>11/28/2018</a:t>
+              <a:t>11/28/18</a:t>
             </a:fld>
             <a:endParaRPr lang="en-US" dirty="0"/>
           </a:p>
@@ -5329,7 +5330,7 @@
           <a:p>
             <a:fld id="{4E5A6C69-6797-4E8A-BF37-F2C3751466E9}" type="datetimeFigureOut">
               <a:rPr lang="en-US" dirty="0"/>
-              <a:t>11/28/2018</a:t>
+              <a:t>11/28/18</a:t>
             </a:fld>
             <a:endParaRPr lang="en-US" dirty="0"/>
           </a:p>
@@ -5830,7 +5831,7 @@
           <a:p>
             <a:fld id="{D82014A1-A632-4878-A0D3-F52BA7563730}" type="datetimeFigureOut">
               <a:rPr lang="en-US" dirty="0"/>
-              <a:t>11/28/2018</a:t>
+              <a:t>11/28/18</a:t>
             </a:fld>
             <a:endParaRPr lang="en-US" dirty="0"/>
           </a:p>
@@ -6082,7 +6083,7 @@
           <a:p>
             <a:fld id="{CE99F462-093F-4566-844B-4C71F2739DA5}" type="datetimeFigureOut">
               <a:rPr lang="en-US" dirty="0"/>
-              <a:t>11/28/2018</a:t>
+              <a:t>11/28/18</a:t>
             </a:fld>
             <a:endParaRPr lang="en-US" dirty="0"/>
           </a:p>
@@ -6240,7 +6241,7 @@
           <a:p>
             <a:fld id="{3D24A7AC-904D-4781-85BA-7D10C17ED021}" type="datetimeFigureOut">
               <a:rPr lang="en-US" dirty="0"/>
-              <a:t>11/28/2018</a:t>
+              <a:t>11/28/18</a:t>
             </a:fld>
             <a:endParaRPr lang="en-US" dirty="0"/>
           </a:p>
@@ -6625,7 +6626,7 @@
           <a:p>
             <a:fld id="{E331444B-B92B-4E27-8C94-BB93EAF5CB18}" type="datetimeFigureOut">
               <a:rPr lang="en-US" dirty="0"/>
-              <a:t>11/28/2018</a:t>
+              <a:t>11/28/18</a:t>
             </a:fld>
             <a:endParaRPr lang="en-US" dirty="0"/>
           </a:p>
@@ -7029,7 +7030,7 @@
           <a:p>
             <a:fld id="{363EFA5E-FA76-400D-B3DC-F0BA90E6D107}" type="datetimeFigureOut">
               <a:rPr lang="en-US" dirty="0"/>
-              <a:t>11/28/2018</a:t>
+              <a:t>11/28/18</a:t>
             </a:fld>
             <a:endParaRPr lang="en-US" dirty="0"/>
           </a:p>
@@ -7268,7 +7269,7 @@
           <a:p>
             <a:fld id="{9D6E9DEC-419B-4CC5-A080-3B06BD5A8291}" type="datetimeFigureOut">
               <a:rPr lang="en-US" dirty="0"/>
-              <a:t>11/28/2018</a:t>
+              <a:t>11/28/18</a:t>
             </a:fld>
             <a:endParaRPr lang="en-US" dirty="0"/>
           </a:p>
@@ -8004,7 +8005,7 @@
           <p:cNvPr id="2" name="Title 1">
             <a:extLst>
               <a:ext uri="{FF2B5EF4-FFF2-40B4-BE49-F238E27FC236}">
-                <a16:creationId xmlns:a16="http://schemas.microsoft.com/office/drawing/2014/main" id="{02425920-4602-7F4E-82FA-7BCED6AA478D}"/>
+                <a16:creationId xmlns:a16="http://schemas.microsoft.com/office/drawing/2014/main" id="{1FE74F52-23F4-1643-A39D-44EA21CDDAC8}"/>
               </a:ext>
             </a:extLst>
           </p:cNvPr>
@@ -8021,14 +8022,11 @@
           <a:lstStyle/>
           <a:p>
             <a:r>
-              <a:rPr lang="en-US" b="1" dirty="0">
-                <a:latin typeface="Copperplate" panose="02000504000000020004" pitchFamily="2" charset="77"/>
-              </a:rPr>
-              <a:t>Who Did What</a:t>
-            </a:r>
-            <a:endParaRPr lang="en-US" dirty="0">
-              <a:latin typeface="Copperplate" panose="02000504000000020004" pitchFamily="2" charset="77"/>
-            </a:endParaRPr>
+              <a:rPr lang="en-US" dirty="0">
+                <a:latin typeface="Copperplate" panose="02000504000000020004" pitchFamily="2" charset="77"/>
+              </a:rPr>
+              <a:t>PHP</a:t>
+            </a:r>
           </a:p>
         </p:txBody>
       </p:sp>
@@ -8037,7 +8035,7 @@
           <p:cNvPr id="3" name="Content Placeholder 2">
             <a:extLst>
               <a:ext uri="{FF2B5EF4-FFF2-40B4-BE49-F238E27FC236}">
-                <a16:creationId xmlns:a16="http://schemas.microsoft.com/office/drawing/2014/main" id="{A65FAB35-CD54-4840-9744-C68CB9750652}"/>
+                <a16:creationId xmlns:a16="http://schemas.microsoft.com/office/drawing/2014/main" id="{237B7B40-06F1-434B-AB99-56D4FFE90D66}"/>
               </a:ext>
             </a:extLst>
           </p:cNvPr>
@@ -8050,8 +8048,8 @@
         </p:nvSpPr>
         <p:spPr>
           <a:xfrm>
-            <a:off x="455469" y="2081505"/>
-            <a:ext cx="10877095" cy="4776495"/>
+            <a:off x="830222" y="2171980"/>
+            <a:ext cx="9613861" cy="4408701"/>
           </a:xfrm>
         </p:spPr>
         <p:txBody>
@@ -8060,132 +8058,123 @@
           </a:bodyPr>
           <a:lstStyle/>
           <a:p>
-            <a:pPr>
-              <a:lnSpc>
-                <a:spcPct val="120000"/>
-              </a:lnSpc>
+            <a:pPr marL="0" indent="0">
+              <a:buNone/>
             </a:pPr>
             <a:r>
-              <a:rPr lang="en-US" sz="2000" dirty="0">
-                <a:latin typeface="Copperplate" panose="02000504000000020004" pitchFamily="2" charset="77"/>
-              </a:rPr>
-              <a:t>Brock Gibson: Most of the front end functionality (Firing off the request, filling the list, basic page layout, also typed this document)</a:t>
-            </a:r>
-          </a:p>
-          <a:p>
-            <a:pPr>
-              <a:lnSpc>
-                <a:spcPct val="120000"/>
-              </a:lnSpc>
+              <a:rPr lang="en-US" sz="3200" dirty="0">
+                <a:latin typeface="Copperplate" panose="02000504000000020004" pitchFamily="2" charset="77"/>
+              </a:rPr>
+              <a:t>A simple </a:t>
+            </a:r>
+            <a:r>
+              <a:rPr lang="en-US" sz="3200" dirty="0" err="1">
+                <a:latin typeface="Copperplate" panose="02000504000000020004" pitchFamily="2" charset="77"/>
+              </a:rPr>
+              <a:t>php</a:t>
+            </a:r>
+            <a:r>
+              <a:rPr lang="en-US" sz="3200" dirty="0">
+                <a:latin typeface="Copperplate" panose="02000504000000020004" pitchFamily="2" charset="77"/>
+              </a:rPr>
+              <a:t> script acts as the middleman between the react application and google maps </a:t>
+            </a:r>
+            <a:r>
+              <a:rPr lang="en-US" sz="3200" dirty="0" err="1">
+                <a:latin typeface="Copperplate" panose="02000504000000020004" pitchFamily="2" charset="77"/>
+              </a:rPr>
+              <a:t>api</a:t>
+            </a:r>
+            <a:r>
+              <a:rPr lang="en-US" sz="3200" dirty="0">
+                <a:latin typeface="Copperplate" panose="02000504000000020004" pitchFamily="2" charset="77"/>
+              </a:rPr>
+              <a:t>. </a:t>
+            </a:r>
+          </a:p>
+          <a:p>
+            <a:pPr lvl="1"/>
+            <a:r>
+              <a:rPr lang="en-US" sz="2800" dirty="0">
+                <a:latin typeface="Copperplate" panose="02000504000000020004" pitchFamily="2" charset="77"/>
+              </a:rPr>
+              <a:t>Coordinates sent to </a:t>
+            </a:r>
+            <a:r>
+              <a:rPr lang="en-US" sz="2800" dirty="0" err="1">
+                <a:latin typeface="Copperplate" panose="02000504000000020004" pitchFamily="2" charset="77"/>
+              </a:rPr>
+              <a:t>php</a:t>
+            </a:r>
+            <a:r>
+              <a:rPr lang="en-US" sz="2800" dirty="0">
+                <a:latin typeface="Copperplate" panose="02000504000000020004" pitchFamily="2" charset="77"/>
+              </a:rPr>
+              <a:t> script are forwarded to google maps geolocation </a:t>
+            </a:r>
+            <a:r>
+              <a:rPr lang="en-US" sz="2800" dirty="0" err="1">
+                <a:latin typeface="Copperplate" panose="02000504000000020004" pitchFamily="2" charset="77"/>
+              </a:rPr>
+              <a:t>api</a:t>
+            </a:r>
+            <a:r>
+              <a:rPr lang="en-US" sz="2800" dirty="0">
+                <a:latin typeface="Copperplate" panose="02000504000000020004" pitchFamily="2" charset="77"/>
+              </a:rPr>
+              <a:t>. </a:t>
+            </a:r>
+          </a:p>
+          <a:p>
+            <a:pPr lvl="1"/>
+            <a:r>
+              <a:rPr lang="en-US" sz="2800" dirty="0" err="1">
+                <a:latin typeface="Copperplate" panose="02000504000000020004" pitchFamily="2" charset="77"/>
+              </a:rPr>
+              <a:t>Php</a:t>
+            </a:r>
+            <a:r>
+              <a:rPr lang="en-US" sz="2800" dirty="0">
+                <a:latin typeface="Copperplate" panose="02000504000000020004" pitchFamily="2" charset="77"/>
+              </a:rPr>
+              <a:t> will try to pull </a:t>
+            </a:r>
+            <a:r>
+              <a:rPr lang="en-US" sz="2800" dirty="0" err="1">
+                <a:latin typeface="Copperplate" panose="02000504000000020004" pitchFamily="2" charset="77"/>
+              </a:rPr>
+              <a:t>zipcode</a:t>
+            </a:r>
+            <a:r>
+              <a:rPr lang="en-US" sz="2800" dirty="0">
+                <a:latin typeface="Copperplate" panose="02000504000000020004" pitchFamily="2" charset="77"/>
+              </a:rPr>
+              <a:t> from Google’s response</a:t>
+            </a:r>
+          </a:p>
+          <a:p>
+            <a:pPr lvl="2"/>
+            <a:r>
+              <a:rPr lang="en-US" sz="2400" dirty="0">
+                <a:latin typeface="Copperplate" panose="02000504000000020004" pitchFamily="2" charset="77"/>
+              </a:rPr>
+              <a:t>Null if failed</a:t>
+            </a:r>
+          </a:p>
+          <a:p>
+            <a:pPr marL="914400" lvl="2" indent="0">
+              <a:buNone/>
             </a:pPr>
             <a:endParaRPr lang="en-US" sz="2000" dirty="0">
               <a:latin typeface="Copperplate" panose="02000504000000020004" pitchFamily="2" charset="77"/>
             </a:endParaRPr>
           </a:p>
-          <a:p>
-            <a:pPr>
-              <a:lnSpc>
-                <a:spcPct val="120000"/>
-              </a:lnSpc>
-            </a:pPr>
-            <a:r>
-              <a:rPr lang="en-US" sz="2000" dirty="0">
-                <a:latin typeface="Copperplate" panose="02000504000000020004" pitchFamily="2" charset="77"/>
-              </a:rPr>
-              <a:t>Jordan Liebman: Most of the backend (handling the request to google and returning a JSON response, for a zip code request, and a place details request) also Deployment to Firebase hosting.</a:t>
-            </a:r>
-          </a:p>
-          <a:p>
-            <a:pPr>
-              <a:lnSpc>
-                <a:spcPct val="120000"/>
-              </a:lnSpc>
-            </a:pPr>
-            <a:endParaRPr lang="en-US" sz="2000" dirty="0">
-              <a:latin typeface="Copperplate" panose="02000504000000020004" pitchFamily="2" charset="77"/>
-            </a:endParaRPr>
-          </a:p>
-          <a:p>
-            <a:pPr>
-              <a:lnSpc>
-                <a:spcPct val="120000"/>
-              </a:lnSpc>
-            </a:pPr>
-            <a:r>
-              <a:rPr lang="en-US" sz="2000" dirty="0">
-                <a:latin typeface="Copperplate" panose="02000504000000020004" pitchFamily="2" charset="77"/>
-              </a:rPr>
-              <a:t>Adam Oakes: Navigation through the pages using react router (</a:t>
-            </a:r>
-            <a:r>
-              <a:rPr lang="en-US" sz="2000" dirty="0" err="1">
-                <a:latin typeface="Copperplate" panose="02000504000000020004" pitchFamily="2" charset="77"/>
-              </a:rPr>
-              <a:t>Navbar</a:t>
-            </a:r>
-            <a:r>
-              <a:rPr lang="en-US" sz="2000" dirty="0">
-                <a:latin typeface="Copperplate" panose="02000504000000020004" pitchFamily="2" charset="77"/>
-              </a:rPr>
-              <a:t>)</a:t>
-            </a:r>
-          </a:p>
-          <a:p>
-            <a:pPr>
-              <a:lnSpc>
-                <a:spcPct val="120000"/>
-              </a:lnSpc>
-            </a:pPr>
-            <a:endParaRPr lang="en-US" sz="2000" dirty="0">
-              <a:latin typeface="Copperplate" panose="02000504000000020004" pitchFamily="2" charset="77"/>
-            </a:endParaRPr>
-          </a:p>
-          <a:p>
-            <a:pPr>
-              <a:lnSpc>
-                <a:spcPct val="120000"/>
-              </a:lnSpc>
-            </a:pPr>
-            <a:r>
-              <a:rPr lang="en-US" sz="2000" dirty="0">
-                <a:latin typeface="Copperplate" panose="02000504000000020004" pitchFamily="2" charset="77"/>
-              </a:rPr>
-              <a:t>Ali </a:t>
-            </a:r>
-            <a:r>
-              <a:rPr lang="en-US" sz="2000" dirty="0" err="1">
-                <a:latin typeface="Copperplate" panose="02000504000000020004" pitchFamily="2" charset="77"/>
-              </a:rPr>
-              <a:t>Shahmoradi</a:t>
-            </a:r>
-            <a:r>
-              <a:rPr lang="en-US" sz="2000" dirty="0">
-                <a:latin typeface="Copperplate" panose="02000504000000020004" pitchFamily="2" charset="77"/>
-              </a:rPr>
-              <a:t>: Styling Master (styling and making everything look pretty with </a:t>
-            </a:r>
-            <a:r>
-              <a:rPr lang="en-US" sz="2000" dirty="0" err="1">
-                <a:latin typeface="Copperplate" panose="02000504000000020004" pitchFamily="2" charset="77"/>
-              </a:rPr>
-              <a:t>boostrap</a:t>
-            </a:r>
-            <a:r>
-              <a:rPr lang="en-US" sz="2000" dirty="0">
-                <a:latin typeface="Copperplate" panose="02000504000000020004" pitchFamily="2" charset="77"/>
-              </a:rPr>
-              <a:t>. Everyone loves a good looking and functional application)</a:t>
-            </a:r>
-          </a:p>
-          <a:p>
-            <a:endParaRPr lang="en-US" dirty="0"/>
-          </a:p>
         </p:txBody>
       </p:sp>
     </p:spTree>
     <p:extLst>
       <p:ext uri="{BB962C8B-B14F-4D97-AF65-F5344CB8AC3E}">
-        <p14:creationId xmlns:p14="http://schemas.microsoft.com/office/powerpoint/2010/main" val="3055750466"/>
+        <p14:creationId xmlns:p14="http://schemas.microsoft.com/office/powerpoint/2010/main" val="3885376054"/>
       </p:ext>
     </p:extLst>
   </p:cSld>
@@ -8217,7 +8206,7 @@
           <p:cNvPr id="2" name="Title 1">
             <a:extLst>
               <a:ext uri="{FF2B5EF4-FFF2-40B4-BE49-F238E27FC236}">
-                <a16:creationId xmlns:a16="http://schemas.microsoft.com/office/drawing/2014/main" id="{FA4FBD93-7E2E-7246-B0CE-F98036C71919}"/>
+                <a16:creationId xmlns:a16="http://schemas.microsoft.com/office/drawing/2014/main" id="{02425920-4602-7F4E-82FA-7BCED6AA478D}"/>
               </a:ext>
             </a:extLst>
           </p:cNvPr>
@@ -8234,11 +8223,14 @@
           <a:lstStyle/>
           <a:p>
             <a:r>
-              <a:rPr lang="en-US" dirty="0">
-                <a:latin typeface="Copperplate" panose="02000504000000020004" pitchFamily="2" charset="77"/>
-              </a:rPr>
-              <a:t>DEMO</a:t>
-            </a:r>
+              <a:rPr lang="en-US" b="1" dirty="0">
+                <a:latin typeface="Copperplate" panose="02000504000000020004" pitchFamily="2" charset="77"/>
+              </a:rPr>
+              <a:t>Who Did What</a:t>
+            </a:r>
+            <a:endParaRPr lang="en-US" dirty="0">
+              <a:latin typeface="Copperplate" panose="02000504000000020004" pitchFamily="2" charset="77"/>
+            </a:endParaRPr>
           </a:p>
         </p:txBody>
       </p:sp>
@@ -8247,7 +8239,7 @@
           <p:cNvPr id="3" name="Content Placeholder 2">
             <a:extLst>
               <a:ext uri="{FF2B5EF4-FFF2-40B4-BE49-F238E27FC236}">
-                <a16:creationId xmlns:a16="http://schemas.microsoft.com/office/drawing/2014/main" id="{00D47165-DCEB-4A48-83CA-4C01DC3F17DC}"/>
+                <a16:creationId xmlns:a16="http://schemas.microsoft.com/office/drawing/2014/main" id="{A65FAB35-CD54-4840-9744-C68CB9750652}"/>
               </a:ext>
             </a:extLst>
           </p:cNvPr>
@@ -8260,40 +8252,154 @@
         </p:nvSpPr>
         <p:spPr>
           <a:xfrm>
-            <a:off x="680321" y="3536087"/>
-            <a:ext cx="11296820" cy="3599316"/>
+            <a:off x="455469" y="2081505"/>
+            <a:ext cx="10877095" cy="4776495"/>
           </a:xfrm>
         </p:spPr>
         <p:txBody>
           <a:bodyPr>
-            <a:normAutofit/>
+            <a:normAutofit fontScale="92500" lnSpcReduction="10000"/>
           </a:bodyPr>
           <a:lstStyle/>
           <a:p>
-            <a:pPr marL="0" indent="0">
-              <a:buNone/>
+            <a:pPr>
+              <a:lnSpc>
+                <a:spcPct val="120000"/>
+              </a:lnSpc>
             </a:pPr>
             <a:r>
-              <a:rPr lang="en-US" sz="3600" dirty="0">
-                <a:solidFill>
-                  <a:srgbClr val="0070C0"/>
-                </a:solidFill>
-                <a:hlinkClick r:id="rId2"/>
-              </a:rPr>
-              <a:t>https://hackillinois2018-65d9f.firebaseapp.com/</a:t>
-            </a:r>
-            <a:endParaRPr lang="en-US" sz="3600" dirty="0">
-              <a:solidFill>
-                <a:srgbClr val="0070C0"/>
-              </a:solidFill>
+              <a:rPr lang="en-US" sz="2000" dirty="0">
+                <a:latin typeface="Copperplate" panose="02000504000000020004" pitchFamily="2" charset="77"/>
+              </a:rPr>
+              <a:t>Brock Gibson: Most of the front end functionality (Firing off the request, filling the list, basic page layout, also typed this document)</a:t>
+            </a:r>
+          </a:p>
+          <a:p>
+            <a:pPr>
+              <a:lnSpc>
+                <a:spcPct val="120000"/>
+              </a:lnSpc>
+            </a:pPr>
+            <a:endParaRPr lang="en-US" sz="2000" dirty="0">
+              <a:latin typeface="Copperplate" panose="02000504000000020004" pitchFamily="2" charset="77"/>
             </a:endParaRPr>
+          </a:p>
+          <a:p>
+            <a:pPr>
+              <a:lnSpc>
+                <a:spcPct val="120000"/>
+              </a:lnSpc>
+            </a:pPr>
+            <a:r>
+              <a:rPr lang="en-US" sz="2000" dirty="0">
+                <a:latin typeface="Copperplate" panose="02000504000000020004" pitchFamily="2" charset="77"/>
+              </a:rPr>
+              <a:t>Jordan Liebman: Most of the backend (handling the request to google and returning a JSON response, for a zip code request, and a place details request) also Deployment to Firebase hosting.</a:t>
+            </a:r>
+          </a:p>
+          <a:p>
+            <a:pPr>
+              <a:lnSpc>
+                <a:spcPct val="120000"/>
+              </a:lnSpc>
+            </a:pPr>
+            <a:endParaRPr lang="en-US" sz="2000" dirty="0">
+              <a:latin typeface="Copperplate" panose="02000504000000020004" pitchFamily="2" charset="77"/>
+            </a:endParaRPr>
+          </a:p>
+          <a:p>
+            <a:pPr>
+              <a:lnSpc>
+                <a:spcPct val="120000"/>
+              </a:lnSpc>
+            </a:pPr>
+            <a:r>
+              <a:rPr lang="en-US" sz="2000" dirty="0">
+                <a:latin typeface="Copperplate" panose="02000504000000020004" pitchFamily="2" charset="77"/>
+              </a:rPr>
+              <a:t>Adam Oakes: Created the </a:t>
+            </a:r>
+            <a:r>
+              <a:rPr lang="en-US" sz="2000" dirty="0" err="1">
+                <a:latin typeface="Copperplate" panose="02000504000000020004" pitchFamily="2" charset="77"/>
+              </a:rPr>
+              <a:t>navbar</a:t>
+            </a:r>
+            <a:r>
+              <a:rPr lang="en-US" sz="2000" dirty="0">
+                <a:latin typeface="Copperplate" panose="02000504000000020004" pitchFamily="2" charset="77"/>
+              </a:rPr>
+              <a:t> &amp; handled the auto-location detection functionality; react app &amp; </a:t>
+            </a:r>
+            <a:r>
+              <a:rPr lang="en-US" sz="2000" dirty="0" err="1">
+                <a:latin typeface="Copperplate" panose="02000504000000020004" pitchFamily="2" charset="77"/>
+              </a:rPr>
+              <a:t>php</a:t>
+            </a:r>
+            <a:r>
+              <a:rPr lang="en-US" sz="2000" dirty="0">
+                <a:latin typeface="Copperplate" panose="02000504000000020004" pitchFamily="2" charset="77"/>
+              </a:rPr>
+              <a:t>)</a:t>
+            </a:r>
+          </a:p>
+          <a:p>
+            <a:pPr>
+              <a:lnSpc>
+                <a:spcPct val="120000"/>
+              </a:lnSpc>
+            </a:pPr>
+            <a:endParaRPr lang="en-US" sz="2000" dirty="0">
+              <a:latin typeface="Copperplate" panose="02000504000000020004" pitchFamily="2" charset="77"/>
+            </a:endParaRPr>
+          </a:p>
+          <a:p>
+            <a:pPr>
+              <a:lnSpc>
+                <a:spcPct val="120000"/>
+              </a:lnSpc>
+            </a:pPr>
+            <a:r>
+              <a:rPr lang="en-US" sz="2000" dirty="0">
+                <a:latin typeface="Copperplate" panose="02000504000000020004" pitchFamily="2" charset="77"/>
+              </a:rPr>
+              <a:t>Ali </a:t>
+            </a:r>
+            <a:r>
+              <a:rPr lang="en-US" sz="2000" dirty="0" err="1">
+                <a:latin typeface="Copperplate" panose="02000504000000020004" pitchFamily="2" charset="77"/>
+              </a:rPr>
+              <a:t>Shahmoradi</a:t>
+            </a:r>
+            <a:r>
+              <a:rPr lang="en-US" sz="2000" dirty="0">
+                <a:latin typeface="Copperplate" panose="02000504000000020004" pitchFamily="2" charset="77"/>
+              </a:rPr>
+              <a:t>: Styling Master (styling and making everything look pretty with </a:t>
+            </a:r>
+            <a:r>
+              <a:rPr lang="en-US" sz="2000" dirty="0" err="1">
+                <a:latin typeface="Copperplate" panose="02000504000000020004" pitchFamily="2" charset="77"/>
+              </a:rPr>
+              <a:t>boostrap</a:t>
+            </a:r>
+            <a:r>
+              <a:rPr lang="en-US" sz="2000" dirty="0">
+                <a:latin typeface="Copperplate" panose="02000504000000020004" pitchFamily="2" charset="77"/>
+              </a:rPr>
+              <a:t>. Everyone loves a good looking and functional application)</a:t>
+            </a:r>
+          </a:p>
+          <a:p>
+            <a:endParaRPr lang="en-US" dirty="0"/>
           </a:p>
         </p:txBody>
       </p:sp>
     </p:spTree>
     <p:extLst>
       <p:ext uri="{BB962C8B-B14F-4D97-AF65-F5344CB8AC3E}">
-        <p14:creationId xmlns:p14="http://schemas.microsoft.com/office/powerpoint/2010/main" val="3407307679"/>
+        <p14:creationId xmlns:p14="http://schemas.microsoft.com/office/powerpoint/2010/main" val="1583792813"/>
       </p:ext>
     </p:extLst>
   </p:cSld>
@@ -8325,7 +8431,7 @@
           <p:cNvPr id="2" name="Title 1">
             <a:extLst>
               <a:ext uri="{FF2B5EF4-FFF2-40B4-BE49-F238E27FC236}">
-                <a16:creationId xmlns:a16="http://schemas.microsoft.com/office/drawing/2014/main" id="{4899B477-AD3F-A043-8B4C-4B51E8182D05}"/>
+                <a16:creationId xmlns:a16="http://schemas.microsoft.com/office/drawing/2014/main" id="{FA4FBD93-7E2E-7246-B0CE-F98036C71919}"/>
               </a:ext>
             </a:extLst>
           </p:cNvPr>
@@ -8342,14 +8448,11 @@
           <a:lstStyle/>
           <a:p>
             <a:r>
-              <a:rPr lang="en-US" b="1" dirty="0">
-                <a:latin typeface="Copperplate" panose="02000504000000020004" pitchFamily="2" charset="77"/>
-              </a:rPr>
-              <a:t>Tips and Tricks</a:t>
-            </a:r>
-            <a:endParaRPr lang="en-US" dirty="0">
-              <a:latin typeface="Copperplate" panose="02000504000000020004" pitchFamily="2" charset="77"/>
-            </a:endParaRPr>
+              <a:rPr lang="en-US" dirty="0">
+                <a:latin typeface="Copperplate" panose="02000504000000020004" pitchFamily="2" charset="77"/>
+              </a:rPr>
+              <a:t>DEMO</a:t>
+            </a:r>
           </a:p>
         </p:txBody>
       </p:sp>
@@ -8358,7 +8461,7 @@
           <p:cNvPr id="3" name="Content Placeholder 2">
             <a:extLst>
               <a:ext uri="{FF2B5EF4-FFF2-40B4-BE49-F238E27FC236}">
-                <a16:creationId xmlns:a16="http://schemas.microsoft.com/office/drawing/2014/main" id="{CE7D7E25-3AF8-F242-9288-846DF3CA62D0}"/>
+                <a16:creationId xmlns:a16="http://schemas.microsoft.com/office/drawing/2014/main" id="{00D47165-DCEB-4A48-83CA-4C01DC3F17DC}"/>
               </a:ext>
             </a:extLst>
           </p:cNvPr>
@@ -8371,8 +8474,8 @@
         </p:nvSpPr>
         <p:spPr>
           <a:xfrm>
-            <a:off x="680321" y="2098624"/>
-            <a:ext cx="10217528" cy="4557010"/>
+            <a:off x="680321" y="3536087"/>
+            <a:ext cx="11296820" cy="3599316"/>
           </a:xfrm>
         </p:spPr>
         <p:txBody>
@@ -8381,75 +8484,30 @@
           </a:bodyPr>
           <a:lstStyle/>
           <a:p>
-            <a:r>
-              <a:rPr lang="en-US" dirty="0">
-                <a:latin typeface="Copperplate" panose="02000504000000020004" pitchFamily="2" charset="77"/>
-              </a:rPr>
-              <a:t>Deployment: Firebase is the way to go to get a simple app up and running super quickly, and most importantly, secure(HTTPS) and free.</a:t>
-            </a:r>
-          </a:p>
-          <a:p>
-            <a:endParaRPr lang="en-US" dirty="0">
-              <a:latin typeface="Copperplate" panose="02000504000000020004" pitchFamily="2" charset="77"/>
+            <a:pPr marL="0" indent="0">
+              <a:buNone/>
+            </a:pPr>
+            <a:r>
+              <a:rPr lang="en-US" sz="3600" dirty="0">
+                <a:solidFill>
+                  <a:srgbClr val="0070C0"/>
+                </a:solidFill>
+                <a:hlinkClick r:id="rId2"/>
+              </a:rPr>
+              <a:t>https://hackillinois2018-65d9f.firebaseapp.com/</a:t>
+            </a:r>
+            <a:endParaRPr lang="en-US" sz="3600" dirty="0">
+              <a:solidFill>
+                <a:srgbClr val="0070C0"/>
+              </a:solidFill>
             </a:endParaRPr>
-          </a:p>
-          <a:p>
-            <a:r>
-              <a:rPr lang="en-US" dirty="0">
-                <a:latin typeface="Copperplate" panose="02000504000000020004" pitchFamily="2" charset="77"/>
-              </a:rPr>
-              <a:t>React is here to stay, so I'd learn it. </a:t>
-            </a:r>
-          </a:p>
-          <a:p>
-            <a:pPr lvl="1"/>
-            <a:r>
-              <a:rPr lang="en-US" dirty="0">
-                <a:latin typeface="Copperplate" panose="02000504000000020004" pitchFamily="2" charset="77"/>
-              </a:rPr>
-              <a:t>It is one of the biggest repos and most used modern frameworks, but also has one of the smallest ratios of issues, which means they are resolved quickly. It is managed well, and updated  constantly.</a:t>
-            </a:r>
-          </a:p>
-          <a:p>
-            <a:pPr lvl="2"/>
-            <a:r>
-              <a:rPr lang="en-US" dirty="0">
-                <a:latin typeface="Copperplate" panose="02000504000000020004" pitchFamily="2" charset="77"/>
-              </a:rPr>
-              <a:t>angular has over 2,200 open issue requests, </a:t>
-            </a:r>
-          </a:p>
-          <a:p>
-            <a:pPr lvl="2"/>
-            <a:r>
-              <a:rPr lang="en-US" dirty="0">
-                <a:latin typeface="Copperplate" panose="02000504000000020004" pitchFamily="2" charset="77"/>
-              </a:rPr>
-              <a:t>react is around 350.</a:t>
-            </a:r>
-          </a:p>
-          <a:p>
-            <a:endParaRPr lang="en-US" dirty="0">
-              <a:latin typeface="Copperplate" panose="02000504000000020004" pitchFamily="2" charset="77"/>
-            </a:endParaRPr>
-          </a:p>
-          <a:p>
-            <a:r>
-              <a:rPr lang="en-US" dirty="0">
-                <a:latin typeface="Copperplate" panose="02000504000000020004" pitchFamily="2" charset="77"/>
-              </a:rPr>
-              <a:t>P.S: Don't work on master kids!</a:t>
-            </a:r>
-          </a:p>
-          <a:p>
-            <a:endParaRPr lang="en-US" dirty="0"/>
           </a:p>
         </p:txBody>
       </p:sp>
     </p:spTree>
     <p:extLst>
       <p:ext uri="{BB962C8B-B14F-4D97-AF65-F5344CB8AC3E}">
-        <p14:creationId xmlns:p14="http://schemas.microsoft.com/office/powerpoint/2010/main" val="1995203212"/>
+        <p14:creationId xmlns:p14="http://schemas.microsoft.com/office/powerpoint/2010/main" val="3407307679"/>
       </p:ext>
     </p:extLst>
   </p:cSld>
@@ -8481,7 +8539,7 @@
           <p:cNvPr id="2" name="Title 1">
             <a:extLst>
               <a:ext uri="{FF2B5EF4-FFF2-40B4-BE49-F238E27FC236}">
-                <a16:creationId xmlns:a16="http://schemas.microsoft.com/office/drawing/2014/main" id="{D1E8A1DE-D804-4747-AF77-DB63D8B4AF64}"/>
+                <a16:creationId xmlns:a16="http://schemas.microsoft.com/office/drawing/2014/main" id="{4899B477-AD3F-A043-8B4C-4B51E8182D05}"/>
               </a:ext>
             </a:extLst>
           </p:cNvPr>
@@ -8501,7 +8559,7 @@
               <a:rPr lang="en-US" b="1" dirty="0">
                 <a:latin typeface="Copperplate" panose="02000504000000020004" pitchFamily="2" charset="77"/>
               </a:rPr>
-              <a:t>The Future:</a:t>
+              <a:t>Tips and Tricks</a:t>
             </a:r>
             <a:endParaRPr lang="en-US" dirty="0">
               <a:latin typeface="Copperplate" panose="02000504000000020004" pitchFamily="2" charset="77"/>
@@ -8514,7 +8572,7 @@
           <p:cNvPr id="3" name="Content Placeholder 2">
             <a:extLst>
               <a:ext uri="{FF2B5EF4-FFF2-40B4-BE49-F238E27FC236}">
-                <a16:creationId xmlns:a16="http://schemas.microsoft.com/office/drawing/2014/main" id="{2D8CE775-DF0F-534F-A67D-53BBEB841E68}"/>
+                <a16:creationId xmlns:a16="http://schemas.microsoft.com/office/drawing/2014/main" id="{CE7D7E25-3AF8-F242-9288-846DF3CA62D0}"/>
               </a:ext>
             </a:extLst>
           </p:cNvPr>
@@ -8527,8 +8585,8 @@
         </p:nvSpPr>
         <p:spPr>
           <a:xfrm>
-            <a:off x="680321" y="2201961"/>
-            <a:ext cx="10637253" cy="4168858"/>
+            <a:off x="680321" y="2098624"/>
+            <a:ext cx="10217528" cy="4557010"/>
           </a:xfrm>
         </p:spPr>
         <p:txBody>
@@ -8541,41 +8599,10 @@
               <a:rPr lang="en-US" dirty="0">
                 <a:latin typeface="Copperplate" panose="02000504000000020004" pitchFamily="2" charset="77"/>
               </a:rPr>
-              <a:t>Unfinished work</a:t>
-            </a:r>
-          </a:p>
-          <a:p>
-            <a:pPr lvl="1"/>
-            <a:r>
-              <a:rPr lang="en-US" dirty="0">
-                <a:latin typeface="Copperplate" panose="02000504000000020004" pitchFamily="2" charset="77"/>
-              </a:rPr>
-              <a:t>We would like to have working navigation in a good looking  navbar.</a:t>
-            </a:r>
-          </a:p>
-          <a:p>
-            <a:pPr lvl="1"/>
-            <a:r>
-              <a:rPr lang="en-US" dirty="0">
-                <a:latin typeface="Copperplate" panose="02000504000000020004" pitchFamily="2" charset="77"/>
-              </a:rPr>
-              <a:t>Photo references are returned in the JSON but photos were not Implemented in the front end.</a:t>
-            </a:r>
-          </a:p>
-          <a:p>
-            <a:pPr lvl="1"/>
-            <a:r>
-              <a:rPr lang="en-US" dirty="0">
-                <a:latin typeface="Copperplate" panose="02000504000000020004" pitchFamily="2" charset="77"/>
-              </a:rPr>
-              <a:t>(pull up postman to look at JSON responses &amp; </a:t>
-            </a:r>
-            <a:r>
-              <a:rPr lang="en-US">
-                <a:latin typeface="Copperplate" panose="02000504000000020004" pitchFamily="2" charset="77"/>
-              </a:rPr>
-              <a:t>photo responses)</a:t>
-            </a:r>
+              <a:t>Deployment: Firebase is the way to go to get a simple app up and running super quickly, and most importantly, secure(HTTPS) and free.</a:t>
+            </a:r>
+          </a:p>
+          <a:p>
             <a:endParaRPr lang="en-US" dirty="0">
               <a:latin typeface="Copperplate" panose="02000504000000020004" pitchFamily="2" charset="77"/>
             </a:endParaRPr>
@@ -8585,7 +8612,7 @@
               <a:rPr lang="en-US" dirty="0">
                 <a:latin typeface="Copperplate" panose="02000504000000020004" pitchFamily="2" charset="77"/>
               </a:rPr>
-              <a:t>Further Ideas</a:t>
+              <a:t>React is here to stay, so I'd learn it. </a:t>
             </a:r>
           </a:p>
           <a:p>
@@ -8594,21 +8621,49 @@
               <a:rPr lang="en-US" dirty="0">
                 <a:latin typeface="Copperplate" panose="02000504000000020004" pitchFamily="2" charset="77"/>
               </a:rPr>
-              <a:t>implement an actual map with pins of the pizza places in your area. Doing it that way would allow you to visually see the location, as well as a list.</a:t>
-            </a:r>
-          </a:p>
-          <a:p>
-            <a:pPr lvl="1"/>
+              <a:t>It is one of the biggest repos and most used modern frameworks, but also has one of the smallest ratios of issues, which means they are resolved quickly. It is managed well, and updated  constantly.</a:t>
+            </a:r>
+          </a:p>
+          <a:p>
+            <a:pPr lvl="2"/>
+            <a:r>
+              <a:rPr lang="en-US" dirty="0">
+                <a:latin typeface="Copperplate" panose="02000504000000020004" pitchFamily="2" charset="77"/>
+              </a:rPr>
+              <a:t>angular has over 2,200 open issue requests, </a:t>
+            </a:r>
+          </a:p>
+          <a:p>
+            <a:pPr lvl="2"/>
+            <a:r>
+              <a:rPr lang="en-US" dirty="0">
+                <a:latin typeface="Copperplate" panose="02000504000000020004" pitchFamily="2" charset="77"/>
+              </a:rPr>
+              <a:t>react is around 350.</a:t>
+            </a:r>
+          </a:p>
+          <a:p>
             <a:endParaRPr lang="en-US" dirty="0">
               <a:latin typeface="Copperplate" panose="02000504000000020004" pitchFamily="2" charset="77"/>
             </a:endParaRPr>
           </a:p>
+          <a:p>
+            <a:r>
+              <a:rPr lang="en-US" dirty="0">
+                <a:latin typeface="Copperplate" panose="02000504000000020004" pitchFamily="2" charset="77"/>
+              </a:rPr>
+              <a:t>P.S: Don't work on master kids!</a:t>
+            </a:r>
+          </a:p>
+          <a:p>
+            <a:endParaRPr lang="en-US" dirty="0"/>
+          </a:p>
         </p:txBody>
       </p:sp>
     </p:spTree>
     <p:extLst>
       <p:ext uri="{BB962C8B-B14F-4D97-AF65-F5344CB8AC3E}">
-        <p14:creationId xmlns:p14="http://schemas.microsoft.com/office/powerpoint/2010/main" val="284935561"/>
+        <p14:creationId xmlns:p14="http://schemas.microsoft.com/office/powerpoint/2010/main" val="1995203212"/>
       </p:ext>
     </p:extLst>
   </p:cSld>
@@ -8640,6 +8695,165 @@
           <p:cNvPr id="2" name="Title 1">
             <a:extLst>
               <a:ext uri="{FF2B5EF4-FFF2-40B4-BE49-F238E27FC236}">
+                <a16:creationId xmlns:a16="http://schemas.microsoft.com/office/drawing/2014/main" id="{D1E8A1DE-D804-4747-AF77-DB63D8B4AF64}"/>
+              </a:ext>
+            </a:extLst>
+          </p:cNvPr>
+          <p:cNvSpPr>
+            <a:spLocks noGrp="1"/>
+          </p:cNvSpPr>
+          <p:nvPr>
+            <p:ph type="title"/>
+          </p:nvPr>
+        </p:nvSpPr>
+        <p:spPr/>
+        <p:txBody>
+          <a:bodyPr/>
+          <a:lstStyle/>
+          <a:p>
+            <a:r>
+              <a:rPr lang="en-US" b="1" dirty="0">
+                <a:latin typeface="Copperplate" panose="02000504000000020004" pitchFamily="2" charset="77"/>
+              </a:rPr>
+              <a:t>The Future:</a:t>
+            </a:r>
+            <a:endParaRPr lang="en-US" dirty="0">
+              <a:latin typeface="Copperplate" panose="02000504000000020004" pitchFamily="2" charset="77"/>
+            </a:endParaRPr>
+          </a:p>
+        </p:txBody>
+      </p:sp>
+      <p:sp>
+        <p:nvSpPr>
+          <p:cNvPr id="3" name="Content Placeholder 2">
+            <a:extLst>
+              <a:ext uri="{FF2B5EF4-FFF2-40B4-BE49-F238E27FC236}">
+                <a16:creationId xmlns:a16="http://schemas.microsoft.com/office/drawing/2014/main" id="{2D8CE775-DF0F-534F-A67D-53BBEB841E68}"/>
+              </a:ext>
+            </a:extLst>
+          </p:cNvPr>
+          <p:cNvSpPr>
+            <a:spLocks noGrp="1"/>
+          </p:cNvSpPr>
+          <p:nvPr>
+            <p:ph idx="1"/>
+          </p:nvPr>
+        </p:nvSpPr>
+        <p:spPr>
+          <a:xfrm>
+            <a:off x="680321" y="2201961"/>
+            <a:ext cx="10637253" cy="4168858"/>
+          </a:xfrm>
+        </p:spPr>
+        <p:txBody>
+          <a:bodyPr>
+            <a:normAutofit/>
+          </a:bodyPr>
+          <a:lstStyle/>
+          <a:p>
+            <a:r>
+              <a:rPr lang="en-US" dirty="0">
+                <a:latin typeface="Copperplate" panose="02000504000000020004" pitchFamily="2" charset="77"/>
+              </a:rPr>
+              <a:t>Unfinished work</a:t>
+            </a:r>
+          </a:p>
+          <a:p>
+            <a:pPr lvl="1"/>
+            <a:r>
+              <a:rPr lang="en-US" dirty="0">
+                <a:latin typeface="Copperplate" panose="02000504000000020004" pitchFamily="2" charset="77"/>
+              </a:rPr>
+              <a:t>We would like to have working navigation in a good looking  navbar.</a:t>
+            </a:r>
+          </a:p>
+          <a:p>
+            <a:pPr lvl="1"/>
+            <a:r>
+              <a:rPr lang="en-US" dirty="0">
+                <a:latin typeface="Copperplate" panose="02000504000000020004" pitchFamily="2" charset="77"/>
+              </a:rPr>
+              <a:t>Photo references are returned in the JSON but photos were not Implemented in the front end.</a:t>
+            </a:r>
+          </a:p>
+          <a:p>
+            <a:pPr lvl="1"/>
+            <a:r>
+              <a:rPr lang="en-US" dirty="0">
+                <a:latin typeface="Copperplate" panose="02000504000000020004" pitchFamily="2" charset="77"/>
+              </a:rPr>
+              <a:t>(pull up postman to look at JSON responses &amp; </a:t>
+            </a:r>
+            <a:r>
+              <a:rPr lang="en-US">
+                <a:latin typeface="Copperplate" panose="02000504000000020004" pitchFamily="2" charset="77"/>
+              </a:rPr>
+              <a:t>photo responses)</a:t>
+            </a:r>
+            <a:endParaRPr lang="en-US" dirty="0">
+              <a:latin typeface="Copperplate" panose="02000504000000020004" pitchFamily="2" charset="77"/>
+            </a:endParaRPr>
+          </a:p>
+          <a:p>
+            <a:r>
+              <a:rPr lang="en-US" dirty="0">
+                <a:latin typeface="Copperplate" panose="02000504000000020004" pitchFamily="2" charset="77"/>
+              </a:rPr>
+              <a:t>Further Ideas</a:t>
+            </a:r>
+          </a:p>
+          <a:p>
+            <a:pPr lvl="1"/>
+            <a:r>
+              <a:rPr lang="en-US" dirty="0">
+                <a:latin typeface="Copperplate" panose="02000504000000020004" pitchFamily="2" charset="77"/>
+              </a:rPr>
+              <a:t>implement an actual map with pins of the pizza places in your area. Doing it that way would allow you to visually see the location, as well as a list.</a:t>
+            </a:r>
+          </a:p>
+          <a:p>
+            <a:pPr lvl="1"/>
+            <a:endParaRPr lang="en-US" dirty="0">
+              <a:latin typeface="Copperplate" panose="02000504000000020004" pitchFamily="2" charset="77"/>
+            </a:endParaRPr>
+          </a:p>
+        </p:txBody>
+      </p:sp>
+    </p:spTree>
+    <p:extLst>
+      <p:ext uri="{BB962C8B-B14F-4D97-AF65-F5344CB8AC3E}">
+        <p14:creationId xmlns:p14="http://schemas.microsoft.com/office/powerpoint/2010/main" val="284935561"/>
+      </p:ext>
+    </p:extLst>
+  </p:cSld>
+  <p:clrMapOvr>
+    <a:masterClrMapping/>
+  </p:clrMapOvr>
+</p:sld>
+</file>
+
+<file path=ppt/slides/slide17.xml><?xml version="1.0" encoding="utf-8"?>
+<p:sld xmlns:a="http://schemas.openxmlformats.org/drawingml/2006/main" xmlns:r="http://schemas.openxmlformats.org/officeDocument/2006/relationships" xmlns:p="http://schemas.openxmlformats.org/presentationml/2006/main">
+  <p:cSld>
+    <p:spTree>
+      <p:nvGrpSpPr>
+        <p:cNvPr id="1" name=""/>
+        <p:cNvGrpSpPr/>
+        <p:nvPr/>
+      </p:nvGrpSpPr>
+      <p:grpSpPr>
+        <a:xfrm>
+          <a:off x="0" y="0"/>
+          <a:ext cx="0" cy="0"/>
+          <a:chOff x="0" y="0"/>
+          <a:chExt cx="0" cy="0"/>
+        </a:xfrm>
+      </p:grpSpPr>
+      <p:sp>
+        <p:nvSpPr>
+          <p:cNvPr id="2" name="Title 1">
+            <a:extLst>
+              <a:ext uri="{FF2B5EF4-FFF2-40B4-BE49-F238E27FC236}">
                 <a16:creationId xmlns:a16="http://schemas.microsoft.com/office/drawing/2014/main" id="{A3B3ABBC-2015-6C4E-A485-6280E16B692E}"/>
               </a:ext>
             </a:extLst>
@@ -8683,8 +8897,8 @@
         </p:nvSpPr>
         <p:spPr>
           <a:xfrm>
-            <a:off x="680321" y="1992098"/>
-            <a:ext cx="10562302" cy="4048937"/>
+            <a:off x="680321" y="1992097"/>
+            <a:ext cx="10562302" cy="4678525"/>
           </a:xfrm>
         </p:spPr>
         <p:txBody>
@@ -8693,17 +8907,121 @@
           </a:bodyPr>
           <a:lstStyle/>
           <a:p>
-            <a:pPr>
+            <a:pPr marL="0" indent="0">
               <a:lnSpc>
-                <a:spcPct val="200000"/>
+                <a:spcPct val="150000"/>
               </a:lnSpc>
+              <a:buNone/>
             </a:pPr>
             <a:r>
-              <a:rPr lang="en-US" sz="3200" dirty="0">
+              <a:rPr lang="en-US" sz="2800" dirty="0">
                 <a:latin typeface="Copperplate" panose="02000504000000020004" pitchFamily="2" charset="77"/>
               </a:rPr>
               <a:t>FRONTEND GIT: </a:t>
             </a:r>
+          </a:p>
+          <a:p>
+            <a:pPr marL="457200" lvl="1" indent="0">
+              <a:lnSpc>
+                <a:spcPct val="150000"/>
+              </a:lnSpc>
+              <a:buNone/>
+            </a:pPr>
+            <a:r>
+              <a:rPr lang="en-US" sz="2400" dirty="0">
+                <a:latin typeface="Copperplate" panose="02000504000000020004" pitchFamily="2" charset="77"/>
+                <a:hlinkClick r:id="rId2"/>
+              </a:rPr>
+              <a:t>https://github.com/Brockerboy/Pizza-Now</a:t>
+            </a:r>
+            <a:endParaRPr lang="en-US" sz="2400" dirty="0">
+              <a:latin typeface="Copperplate" panose="02000504000000020004" pitchFamily="2" charset="77"/>
+            </a:endParaRPr>
+          </a:p>
+          <a:p>
+            <a:pPr marL="0" indent="0">
+              <a:lnSpc>
+                <a:spcPct val="150000"/>
+              </a:lnSpc>
+              <a:buNone/>
+            </a:pPr>
+            <a:r>
+              <a:rPr lang="en-US" sz="2800" dirty="0">
+                <a:latin typeface="Copperplate" panose="02000504000000020004" pitchFamily="2" charset="77"/>
+              </a:rPr>
+              <a:t>BACKEND GIT: </a:t>
+            </a:r>
+          </a:p>
+          <a:p>
+            <a:pPr marL="457200" lvl="1" indent="0">
+              <a:lnSpc>
+                <a:spcPct val="150000"/>
+              </a:lnSpc>
+              <a:buNone/>
+            </a:pPr>
+            <a:r>
+              <a:rPr lang="en-US" sz="2400" dirty="0">
+                <a:latin typeface="Copperplate" panose="02000504000000020004" pitchFamily="2" charset="77"/>
+                <a:hlinkClick r:id="rId3"/>
+              </a:rPr>
+              <a:t>https://github.com/jordan329/hackweek</a:t>
+            </a:r>
+            <a:endParaRPr lang="en-US" sz="2800" dirty="0">
+              <a:latin typeface="Copperplate" panose="02000504000000020004" pitchFamily="2" charset="77"/>
+            </a:endParaRPr>
+          </a:p>
+          <a:p>
+            <a:pPr marL="0" indent="0">
+              <a:lnSpc>
+                <a:spcPct val="150000"/>
+              </a:lnSpc>
+              <a:buNone/>
+            </a:pPr>
+            <a:r>
+              <a:rPr lang="en-US" sz="2800" dirty="0">
+                <a:latin typeface="Copperplate" panose="02000504000000020004" pitchFamily="2" charset="77"/>
+              </a:rPr>
+              <a:t>PHP GIT:</a:t>
+            </a:r>
+          </a:p>
+          <a:p>
+            <a:pPr marL="457200" lvl="1" indent="0">
+              <a:lnSpc>
+                <a:spcPct val="150000"/>
+              </a:lnSpc>
+              <a:buNone/>
+            </a:pPr>
+            <a:r>
+              <a:rPr lang="en-US" sz="2400" u="sng" dirty="0">
+                <a:latin typeface="Copperplate" panose="02000504000000020004" pitchFamily="2" charset="77"/>
+                <a:hlinkClick r:id="rId4"/>
+              </a:rPr>
+              <a:t>https://</a:t>
+            </a:r>
+            <a:r>
+              <a:rPr lang="en-US" sz="2400" u="sng" dirty="0" err="1">
+                <a:latin typeface="Copperplate" panose="02000504000000020004" pitchFamily="2" charset="77"/>
+                <a:hlinkClick r:id="rId4"/>
+              </a:rPr>
+              <a:t>github.com</a:t>
+            </a:r>
+            <a:r>
+              <a:rPr lang="en-US" sz="2400" u="sng" dirty="0">
+                <a:latin typeface="Copperplate" panose="02000504000000020004" pitchFamily="2" charset="77"/>
+                <a:hlinkClick r:id="rId4"/>
+              </a:rPr>
+              <a:t>/amot92/</a:t>
+            </a:r>
+            <a:r>
+              <a:rPr lang="en-US" sz="2400" u="sng" dirty="0" err="1">
+                <a:latin typeface="Copperplate" panose="02000504000000020004" pitchFamily="2" charset="77"/>
+                <a:hlinkClick r:id="rId4"/>
+              </a:rPr>
+              <a:t>coordsToZipAPI</a:t>
+            </a:r>
+            <a:endParaRPr lang="en-US" sz="2400" u="sng" dirty="0">
+              <a:latin typeface="Copperplate" panose="02000504000000020004" pitchFamily="2" charset="77"/>
+            </a:endParaRPr>
           </a:p>
           <a:p>
             <a:pPr marL="457200" lvl="1" indent="0">
@@ -8712,49 +9030,11 @@
               </a:lnSpc>
               <a:buNone/>
             </a:pPr>
-            <a:r>
-              <a:rPr lang="en-US" sz="2800" dirty="0">
-                <a:latin typeface="Copperplate" panose="02000504000000020004" pitchFamily="2" charset="77"/>
-                <a:hlinkClick r:id="rId2"/>
-              </a:rPr>
-              <a:t>https://github.com/Brockerboy/Pizza-Now</a:t>
-            </a:r>
             <a:endParaRPr lang="en-US" sz="2800" dirty="0">
               <a:latin typeface="Copperplate" panose="02000504000000020004" pitchFamily="2" charset="77"/>
             </a:endParaRPr>
           </a:p>
           <a:p>
-            <a:pPr>
-              <a:lnSpc>
-                <a:spcPct val="200000"/>
-              </a:lnSpc>
-            </a:pPr>
-            <a:r>
-              <a:rPr lang="en-US" sz="3200" dirty="0">
-                <a:latin typeface="Copperplate" panose="02000504000000020004" pitchFamily="2" charset="77"/>
-              </a:rPr>
-              <a:t>BACKEND GIT: </a:t>
-            </a:r>
-          </a:p>
-          <a:p>
-            <a:pPr marL="457200" lvl="1" indent="0">
-              <a:lnSpc>
-                <a:spcPct val="200000"/>
-              </a:lnSpc>
-              <a:buNone/>
-            </a:pPr>
-            <a:r>
-              <a:rPr lang="en-US" sz="2800" dirty="0">
-                <a:latin typeface="Copperplate" panose="02000504000000020004" pitchFamily="2" charset="77"/>
-                <a:hlinkClick r:id="rId3"/>
-              </a:rPr>
-              <a:t>https://github.com/jordan329/hackweek</a:t>
-            </a:r>
-            <a:endParaRPr lang="en-US" sz="2800" dirty="0">
-              <a:latin typeface="Copperplate" panose="02000504000000020004" pitchFamily="2" charset="77"/>
-            </a:endParaRPr>
-          </a:p>
-          <a:p>
             <a:pPr marL="0" indent="0">
               <a:buNone/>
             </a:pPr>
@@ -8765,7 +9045,7 @@
     </p:spTree>
     <p:extLst>
       <p:ext uri="{BB962C8B-B14F-4D97-AF65-F5344CB8AC3E}">
-        <p14:creationId xmlns:p14="http://schemas.microsoft.com/office/powerpoint/2010/main" val="2320371574"/>
+        <p14:creationId xmlns:p14="http://schemas.microsoft.com/office/powerpoint/2010/main" val="2509500749"/>
       </p:ext>
     </p:extLst>
   </p:cSld>
@@ -9658,6 +9938,19 @@
             </a:r>
           </a:p>
           <a:p>
+            <a:pPr marL="342900" indent="-342900">
+              <a:lnSpc>
+                <a:spcPct val="200000"/>
+              </a:lnSpc>
+            </a:pPr>
+            <a:r>
+              <a:rPr lang="en-US" sz="2600" dirty="0">
+                <a:latin typeface="Copperplate" panose="02000504000000020004" pitchFamily="2" charset="77"/>
+              </a:rPr>
+              <a:t>PHP</a:t>
+            </a:r>
+          </a:p>
+          <a:p>
             <a:pPr>
               <a:lnSpc>
                 <a:spcPct val="200000"/>
@@ -9897,7 +10190,7 @@
         </p:spPr>
         <p:txBody>
           <a:bodyPr>
-            <a:normAutofit/>
+            <a:normAutofit lnSpcReduction="10000"/>
           </a:bodyPr>
           <a:lstStyle/>
           <a:p>
@@ -10012,7 +10305,7 @@
         </p:spPr>
         <p:txBody>
           <a:bodyPr>
-            <a:normAutofit/>
+            <a:normAutofit lnSpcReduction="10000"/>
           </a:bodyPr>
           <a:lstStyle/>
           <a:p>
@@ -10122,7 +10415,7 @@
         <p:spPr/>
         <p:txBody>
           <a:bodyPr>
-            <a:normAutofit fontScale="92500" lnSpcReduction="20000"/>
+            <a:normAutofit fontScale="77500" lnSpcReduction="20000"/>
           </a:bodyPr>
           <a:lstStyle/>
           <a:p>

</xml_diff>

<commit_message>
removed unneccesary php step in sutoLocation. Updated slides and document.md to refelct it.
</commit_message>
<xml_diff>
--- a/Presentation/PizzaNow.pptx
+++ b/Presentation/PizzaNow.pptx
@@ -16,12 +16,11 @@
     <p:sldId id="265" r:id="rId10"/>
     <p:sldId id="264" r:id="rId11"/>
     <p:sldId id="266" r:id="rId12"/>
-    <p:sldId id="272" r:id="rId13"/>
-    <p:sldId id="273" r:id="rId14"/>
-    <p:sldId id="270" r:id="rId15"/>
-    <p:sldId id="268" r:id="rId16"/>
-    <p:sldId id="269" r:id="rId17"/>
-    <p:sldId id="274" r:id="rId18"/>
+    <p:sldId id="273" r:id="rId13"/>
+    <p:sldId id="270" r:id="rId14"/>
+    <p:sldId id="268" r:id="rId15"/>
+    <p:sldId id="269" r:id="rId16"/>
+    <p:sldId id="274" r:id="rId17"/>
   </p:sldIdLst>
   <p:sldSz cx="12192000" cy="6858000"/>
   <p:notesSz cx="6858000" cy="9144000"/>
@@ -402,7 +401,7 @@
           <a:p>
             <a:fld id="{78ABE3C1-DBE1-495D-B57B-2849774B866A}" type="datetimeFigureOut">
               <a:rPr lang="en-US" dirty="0"/>
-              <a:t>11/28/18</a:t>
+              <a:t>11/29/18</a:t>
             </a:fld>
             <a:endParaRPr lang="en-US" dirty="0"/>
           </a:p>
@@ -811,7 +810,7 @@
           <a:p>
             <a:fld id="{446C117F-5CCF-4837-BE5F-2B92066CAFAF}" type="datetimeFigureOut">
               <a:rPr lang="en-US" dirty="0"/>
-              <a:t>11/28/18</a:t>
+              <a:t>11/29/18</a:t>
             </a:fld>
             <a:endParaRPr lang="en-US" dirty="0"/>
           </a:p>
@@ -1142,7 +1141,7 @@
           <a:p>
             <a:fld id="{84EB90BD-B6CE-46B7-997F-7313B992CCDC}" type="datetimeFigureOut">
               <a:rPr lang="en-US" dirty="0"/>
-              <a:t>11/28/18</a:t>
+              <a:t>11/29/18</a:t>
             </a:fld>
             <a:endParaRPr lang="en-US" dirty="0"/>
           </a:p>
@@ -1542,7 +1541,7 @@
           <a:p>
             <a:fld id="{CDB9D11F-B188-461D-B23F-39381795C052}" type="datetimeFigureOut">
               <a:rPr lang="en-US" dirty="0"/>
-              <a:t>11/28/18</a:t>
+              <a:t>11/29/18</a:t>
             </a:fld>
             <a:endParaRPr lang="en-US" dirty="0"/>
           </a:p>
@@ -2105,7 +2104,7 @@
           <a:p>
             <a:fld id="{52E6D8D9-55A2-4063-B0F3-121F44549695}" type="datetimeFigureOut">
               <a:rPr lang="en-US" dirty="0"/>
-              <a:t>11/28/18</a:t>
+              <a:t>11/29/18</a:t>
             </a:fld>
             <a:endParaRPr lang="en-US" dirty="0"/>
           </a:p>
@@ -2781,7 +2780,7 @@
           <a:p>
             <a:fld id="{D4B24536-994D-4021-A283-9F449C0DB509}" type="datetimeFigureOut">
               <a:rPr lang="en-US" dirty="0"/>
-              <a:t>11/28/18</a:t>
+              <a:t>11/29/18</a:t>
             </a:fld>
             <a:endParaRPr lang="en-US" dirty="0"/>
           </a:p>
@@ -3689,7 +3688,7 @@
           <a:p>
             <a:fld id="{3CBBBB78-C96F-47B7-AB17-D852CA960AC9}" type="datetimeFigureOut">
               <a:rPr lang="en-US" dirty="0"/>
-              <a:t>11/28/18</a:t>
+              <a:t>11/29/18</a:t>
             </a:fld>
             <a:endParaRPr lang="en-US" dirty="0"/>
           </a:p>
@@ -3997,7 +3996,7 @@
           <a:p>
             <a:fld id="{1FA3F48C-C7C6-4055-9F49-3777875E72AE}" type="datetimeFigureOut">
               <a:rPr lang="en-US" dirty="0"/>
-              <a:t>11/28/18</a:t>
+              <a:t>11/29/18</a:t>
             </a:fld>
             <a:endParaRPr lang="en-US" dirty="0"/>
           </a:p>
@@ -4256,7 +4255,7 @@
           <a:p>
             <a:fld id="{6178E61D-D431-422C-9764-11DAFE33AB63}" type="datetimeFigureOut">
               <a:rPr lang="en-US" dirty="0"/>
-              <a:t>11/28/18</a:t>
+              <a:t>11/29/18</a:t>
             </a:fld>
             <a:endParaRPr lang="en-US" dirty="0"/>
           </a:p>
@@ -4575,7 +4574,7 @@
           <a:p>
             <a:fld id="{12DE42F4-6EEF-4EF7-8ED4-2208F0F89A08}" type="datetimeFigureOut">
               <a:rPr lang="en-US" dirty="0"/>
-              <a:t>11/28/18</a:t>
+              <a:t>11/29/18</a:t>
             </a:fld>
             <a:endParaRPr lang="en-US" dirty="0"/>
           </a:p>
@@ -4959,7 +4958,7 @@
           <a:p>
             <a:fld id="{30578ACC-22D6-47C1-A373-4FD133E34F3C}" type="datetimeFigureOut">
               <a:rPr lang="en-US" dirty="0"/>
-              <a:t>11/28/18</a:t>
+              <a:t>11/29/18</a:t>
             </a:fld>
             <a:endParaRPr lang="en-US" dirty="0"/>
           </a:p>
@@ -5330,7 +5329,7 @@
           <a:p>
             <a:fld id="{4E5A6C69-6797-4E8A-BF37-F2C3751466E9}" type="datetimeFigureOut">
               <a:rPr lang="en-US" dirty="0"/>
-              <a:t>11/28/18</a:t>
+              <a:t>11/29/18</a:t>
             </a:fld>
             <a:endParaRPr lang="en-US" dirty="0"/>
           </a:p>
@@ -5831,7 +5830,7 @@
           <a:p>
             <a:fld id="{D82014A1-A632-4878-A0D3-F52BA7563730}" type="datetimeFigureOut">
               <a:rPr lang="en-US" dirty="0"/>
-              <a:t>11/28/18</a:t>
+              <a:t>11/29/18</a:t>
             </a:fld>
             <a:endParaRPr lang="en-US" dirty="0"/>
           </a:p>
@@ -6083,7 +6082,7 @@
           <a:p>
             <a:fld id="{CE99F462-093F-4566-844B-4C71F2739DA5}" type="datetimeFigureOut">
               <a:rPr lang="en-US" dirty="0"/>
-              <a:t>11/28/18</a:t>
+              <a:t>11/29/18</a:t>
             </a:fld>
             <a:endParaRPr lang="en-US" dirty="0"/>
           </a:p>
@@ -6241,7 +6240,7 @@
           <a:p>
             <a:fld id="{3D24A7AC-904D-4781-85BA-7D10C17ED021}" type="datetimeFigureOut">
               <a:rPr lang="en-US" dirty="0"/>
-              <a:t>11/28/18</a:t>
+              <a:t>11/29/18</a:t>
             </a:fld>
             <a:endParaRPr lang="en-US" dirty="0"/>
           </a:p>
@@ -6626,7 +6625,7 @@
           <a:p>
             <a:fld id="{E331444B-B92B-4E27-8C94-BB93EAF5CB18}" type="datetimeFigureOut">
               <a:rPr lang="en-US" dirty="0"/>
-              <a:t>11/28/18</a:t>
+              <a:t>11/29/18</a:t>
             </a:fld>
             <a:endParaRPr lang="en-US" dirty="0"/>
           </a:p>
@@ -7030,7 +7029,7 @@
           <a:p>
             <a:fld id="{363EFA5E-FA76-400D-B3DC-F0BA90E6D107}" type="datetimeFigureOut">
               <a:rPr lang="en-US" dirty="0"/>
-              <a:t>11/28/18</a:t>
+              <a:t>11/29/18</a:t>
             </a:fld>
             <a:endParaRPr lang="en-US" dirty="0"/>
           </a:p>
@@ -7269,7 +7268,7 @@
           <a:p>
             <a:fld id="{9D6E9DEC-419B-4CC5-A080-3B06BD5A8291}" type="datetimeFigureOut">
               <a:rPr lang="en-US" dirty="0"/>
-              <a:t>11/28/18</a:t>
+              <a:t>11/29/18</a:t>
             </a:fld>
             <a:endParaRPr lang="en-US" dirty="0"/>
           </a:p>
@@ -8005,7 +8004,7 @@
           <p:cNvPr id="2" name="Title 1">
             <a:extLst>
               <a:ext uri="{FF2B5EF4-FFF2-40B4-BE49-F238E27FC236}">
-                <a16:creationId xmlns:a16="http://schemas.microsoft.com/office/drawing/2014/main" id="{1FE74F52-23F4-1643-A39D-44EA21CDDAC8}"/>
+                <a16:creationId xmlns:a16="http://schemas.microsoft.com/office/drawing/2014/main" id="{02425920-4602-7F4E-82FA-7BCED6AA478D}"/>
               </a:ext>
             </a:extLst>
           </p:cNvPr>
@@ -8022,11 +8021,14 @@
           <a:lstStyle/>
           <a:p>
             <a:r>
-              <a:rPr lang="en-US" dirty="0">
-                <a:latin typeface="Copperplate" panose="02000504000000020004" pitchFamily="2" charset="77"/>
-              </a:rPr>
-              <a:t>PHP</a:t>
-            </a:r>
+              <a:rPr lang="en-US" b="1" dirty="0">
+                <a:latin typeface="Copperplate" panose="02000504000000020004" pitchFamily="2" charset="77"/>
+              </a:rPr>
+              <a:t>Who Did What</a:t>
+            </a:r>
+            <a:endParaRPr lang="en-US" dirty="0">
+              <a:latin typeface="Copperplate" panose="02000504000000020004" pitchFamily="2" charset="77"/>
+            </a:endParaRPr>
           </a:p>
         </p:txBody>
       </p:sp>
@@ -8035,7 +8037,7 @@
           <p:cNvPr id="3" name="Content Placeholder 2">
             <a:extLst>
               <a:ext uri="{FF2B5EF4-FFF2-40B4-BE49-F238E27FC236}">
-                <a16:creationId xmlns:a16="http://schemas.microsoft.com/office/drawing/2014/main" id="{237B7B40-06F1-434B-AB99-56D4FFE90D66}"/>
+                <a16:creationId xmlns:a16="http://schemas.microsoft.com/office/drawing/2014/main" id="{A65FAB35-CD54-4840-9744-C68CB9750652}"/>
               </a:ext>
             </a:extLst>
           </p:cNvPr>
@@ -8048,133 +8050,142 @@
         </p:nvSpPr>
         <p:spPr>
           <a:xfrm>
-            <a:off x="830222" y="2171980"/>
-            <a:ext cx="9613861" cy="4408701"/>
+            <a:off x="455469" y="2081505"/>
+            <a:ext cx="10877095" cy="4776495"/>
           </a:xfrm>
         </p:spPr>
         <p:txBody>
           <a:bodyPr>
-            <a:normAutofit/>
+            <a:normAutofit fontScale="92500" lnSpcReduction="10000"/>
           </a:bodyPr>
           <a:lstStyle/>
           <a:p>
-            <a:pPr marL="0" indent="0">
-              <a:buNone/>
+            <a:pPr>
+              <a:lnSpc>
+                <a:spcPct val="120000"/>
+              </a:lnSpc>
             </a:pPr>
             <a:r>
-              <a:rPr lang="en-US" sz="3200" dirty="0">
-                <a:latin typeface="Copperplate" panose="02000504000000020004" pitchFamily="2" charset="77"/>
-              </a:rPr>
-              <a:t>A simple </a:t>
-            </a:r>
-            <a:r>
-              <a:rPr lang="en-US" sz="3200" dirty="0" err="1">
-                <a:latin typeface="Copperplate" panose="02000504000000020004" pitchFamily="2" charset="77"/>
-              </a:rPr>
-              <a:t>php</a:t>
-            </a:r>
-            <a:r>
-              <a:rPr lang="en-US" sz="3200" dirty="0">
-                <a:latin typeface="Copperplate" panose="02000504000000020004" pitchFamily="2" charset="77"/>
-              </a:rPr>
-              <a:t> script acts as the middleman between the react application and google maps </a:t>
-            </a:r>
-            <a:r>
-              <a:rPr lang="en-US" sz="3200" dirty="0" err="1">
-                <a:latin typeface="Copperplate" panose="02000504000000020004" pitchFamily="2" charset="77"/>
-              </a:rPr>
-              <a:t>api</a:t>
-            </a:r>
-            <a:r>
-              <a:rPr lang="en-US" sz="3200" dirty="0">
-                <a:latin typeface="Copperplate" panose="02000504000000020004" pitchFamily="2" charset="77"/>
-              </a:rPr>
-              <a:t>. </a:t>
-            </a:r>
-          </a:p>
-          <a:p>
-            <a:pPr lvl="1"/>
-            <a:r>
-              <a:rPr lang="en-US" sz="2800" dirty="0">
-                <a:latin typeface="Copperplate" panose="02000504000000020004" pitchFamily="2" charset="77"/>
-              </a:rPr>
-              <a:t>Coordinates sent to </a:t>
-            </a:r>
-            <a:r>
-              <a:rPr lang="en-US" sz="2800" dirty="0" err="1">
-                <a:latin typeface="Copperplate" panose="02000504000000020004" pitchFamily="2" charset="77"/>
-              </a:rPr>
-              <a:t>php</a:t>
-            </a:r>
-            <a:r>
-              <a:rPr lang="en-US" sz="2800" dirty="0">
-                <a:latin typeface="Copperplate" panose="02000504000000020004" pitchFamily="2" charset="77"/>
-              </a:rPr>
-              <a:t> script are forwarded to google maps geolocation </a:t>
-            </a:r>
-            <a:r>
-              <a:rPr lang="en-US" sz="2800" dirty="0" err="1">
-                <a:latin typeface="Copperplate" panose="02000504000000020004" pitchFamily="2" charset="77"/>
-              </a:rPr>
-              <a:t>api</a:t>
-            </a:r>
-            <a:r>
-              <a:rPr lang="en-US" sz="2800" dirty="0">
-                <a:latin typeface="Copperplate" panose="02000504000000020004" pitchFamily="2" charset="77"/>
-              </a:rPr>
-              <a:t>. </a:t>
-            </a:r>
-          </a:p>
-          <a:p>
-            <a:pPr lvl="1"/>
-            <a:r>
-              <a:rPr lang="en-US" sz="2800" dirty="0" err="1">
-                <a:latin typeface="Copperplate" panose="02000504000000020004" pitchFamily="2" charset="77"/>
-              </a:rPr>
-              <a:t>Php</a:t>
-            </a:r>
-            <a:r>
-              <a:rPr lang="en-US" sz="2800" dirty="0">
-                <a:latin typeface="Copperplate" panose="02000504000000020004" pitchFamily="2" charset="77"/>
-              </a:rPr>
-              <a:t> will try to pull </a:t>
-            </a:r>
-            <a:r>
-              <a:rPr lang="en-US" sz="2800" dirty="0" err="1">
-                <a:latin typeface="Copperplate" panose="02000504000000020004" pitchFamily="2" charset="77"/>
-              </a:rPr>
-              <a:t>zipcode</a:t>
-            </a:r>
-            <a:r>
-              <a:rPr lang="en-US" sz="2800" dirty="0">
-                <a:latin typeface="Copperplate" panose="02000504000000020004" pitchFamily="2" charset="77"/>
-              </a:rPr>
-              <a:t> from Google’s response</a:t>
-            </a:r>
-          </a:p>
-          <a:p>
-            <a:pPr lvl="2"/>
-            <a:r>
-              <a:rPr lang="en-US" sz="2400" dirty="0">
-                <a:latin typeface="Copperplate" panose="02000504000000020004" pitchFamily="2" charset="77"/>
-              </a:rPr>
-              <a:t>Null if failed</a:t>
-            </a:r>
-          </a:p>
-          <a:p>
-            <a:pPr marL="914400" lvl="2" indent="0">
-              <a:buNone/>
+              <a:rPr lang="en-US" sz="2000" dirty="0">
+                <a:latin typeface="Copperplate" panose="02000504000000020004" pitchFamily="2" charset="77"/>
+              </a:rPr>
+              <a:t>Brock Gibson: Most of the front end functionality (Firing off the request, filling the list, basic page layout, also typed this document)</a:t>
+            </a:r>
+          </a:p>
+          <a:p>
+            <a:pPr>
+              <a:lnSpc>
+                <a:spcPct val="120000"/>
+              </a:lnSpc>
             </a:pPr>
             <a:endParaRPr lang="en-US" sz="2000" dirty="0">
               <a:latin typeface="Copperplate" panose="02000504000000020004" pitchFamily="2" charset="77"/>
             </a:endParaRPr>
           </a:p>
+          <a:p>
+            <a:pPr>
+              <a:lnSpc>
+                <a:spcPct val="120000"/>
+              </a:lnSpc>
+            </a:pPr>
+            <a:r>
+              <a:rPr lang="en-US" sz="2000" dirty="0">
+                <a:latin typeface="Copperplate" panose="02000504000000020004" pitchFamily="2" charset="77"/>
+              </a:rPr>
+              <a:t>Jordan Liebman: Most of the backend (handling the request to google and returning a JSON response, for a zip code request, and a place details request) also Deployment to Firebase hosting.</a:t>
+            </a:r>
+          </a:p>
+          <a:p>
+            <a:pPr>
+              <a:lnSpc>
+                <a:spcPct val="120000"/>
+              </a:lnSpc>
+            </a:pPr>
+            <a:endParaRPr lang="en-US" sz="2000" dirty="0">
+              <a:latin typeface="Copperplate" panose="02000504000000020004" pitchFamily="2" charset="77"/>
+            </a:endParaRPr>
+          </a:p>
+          <a:p>
+            <a:pPr>
+              <a:lnSpc>
+                <a:spcPct val="120000"/>
+              </a:lnSpc>
+            </a:pPr>
+            <a:r>
+              <a:rPr lang="en-US" sz="2000" dirty="0">
+                <a:latin typeface="Copperplate" panose="02000504000000020004" pitchFamily="2" charset="77"/>
+              </a:rPr>
+              <a:t>Adam Oakes: Created the </a:t>
+            </a:r>
+            <a:r>
+              <a:rPr lang="en-US" sz="2000" dirty="0" err="1">
+                <a:latin typeface="Copperplate" panose="02000504000000020004" pitchFamily="2" charset="77"/>
+              </a:rPr>
+              <a:t>navbar</a:t>
+            </a:r>
+            <a:r>
+              <a:rPr lang="en-US" sz="2000" dirty="0">
+                <a:latin typeface="Copperplate" panose="02000504000000020004" pitchFamily="2" charset="77"/>
+              </a:rPr>
+              <a:t> &amp; handled the auto-location detection functionality</a:t>
+            </a:r>
+          </a:p>
+          <a:p>
+            <a:pPr>
+              <a:lnSpc>
+                <a:spcPct val="120000"/>
+              </a:lnSpc>
+            </a:pPr>
+            <a:endParaRPr lang="en-US" sz="2000" dirty="0">
+              <a:latin typeface="Copperplate" panose="02000504000000020004" pitchFamily="2" charset="77"/>
+            </a:endParaRPr>
+          </a:p>
+          <a:p>
+            <a:pPr>
+              <a:lnSpc>
+                <a:spcPct val="120000"/>
+              </a:lnSpc>
+            </a:pPr>
+            <a:r>
+              <a:rPr lang="en-US" sz="2000" dirty="0">
+                <a:latin typeface="Copperplate" panose="02000504000000020004" pitchFamily="2" charset="77"/>
+              </a:rPr>
+              <a:t>Ali </a:t>
+            </a:r>
+            <a:r>
+              <a:rPr lang="en-US" sz="2000" dirty="0" err="1">
+                <a:latin typeface="Copperplate" panose="02000504000000020004" pitchFamily="2" charset="77"/>
+              </a:rPr>
+              <a:t>Shahmoradi</a:t>
+            </a:r>
+            <a:r>
+              <a:rPr lang="en-US" sz="2000" dirty="0">
+                <a:latin typeface="Copperplate" panose="02000504000000020004" pitchFamily="2" charset="77"/>
+              </a:rPr>
+              <a:t>: Styling Master (styling and making everything look pretty with </a:t>
+            </a:r>
+            <a:r>
+              <a:rPr lang="en-US" sz="2000" dirty="0" err="1">
+                <a:latin typeface="Copperplate" panose="02000504000000020004" pitchFamily="2" charset="77"/>
+              </a:rPr>
+              <a:t>boostrap</a:t>
+            </a:r>
+            <a:r>
+              <a:rPr lang="en-US" sz="2000" dirty="0">
+                <a:latin typeface="Copperplate" panose="02000504000000020004" pitchFamily="2" charset="77"/>
+              </a:rPr>
+              <a:t>. Everyone loves a good looking and functional application)</a:t>
+            </a:r>
+          </a:p>
+          <a:p>
+            <a:endParaRPr lang="en-US" dirty="0"/>
+          </a:p>
         </p:txBody>
       </p:sp>
     </p:spTree>
     <p:extLst>
       <p:ext uri="{BB962C8B-B14F-4D97-AF65-F5344CB8AC3E}">
-        <p14:creationId xmlns:p14="http://schemas.microsoft.com/office/powerpoint/2010/main" val="3885376054"/>
+        <p14:creationId xmlns:p14="http://schemas.microsoft.com/office/powerpoint/2010/main" val="1583792813"/>
       </p:ext>
     </p:extLst>
   </p:cSld>
@@ -8206,7 +8217,7 @@
           <p:cNvPr id="2" name="Title 1">
             <a:extLst>
               <a:ext uri="{FF2B5EF4-FFF2-40B4-BE49-F238E27FC236}">
-                <a16:creationId xmlns:a16="http://schemas.microsoft.com/office/drawing/2014/main" id="{02425920-4602-7F4E-82FA-7BCED6AA478D}"/>
+                <a16:creationId xmlns:a16="http://schemas.microsoft.com/office/drawing/2014/main" id="{FA4FBD93-7E2E-7246-B0CE-F98036C71919}"/>
               </a:ext>
             </a:extLst>
           </p:cNvPr>
@@ -8223,14 +8234,11 @@
           <a:lstStyle/>
           <a:p>
             <a:r>
-              <a:rPr lang="en-US" b="1" dirty="0">
-                <a:latin typeface="Copperplate" panose="02000504000000020004" pitchFamily="2" charset="77"/>
-              </a:rPr>
-              <a:t>Who Did What</a:t>
-            </a:r>
-            <a:endParaRPr lang="en-US" dirty="0">
-              <a:latin typeface="Copperplate" panose="02000504000000020004" pitchFamily="2" charset="77"/>
-            </a:endParaRPr>
+              <a:rPr lang="en-US" dirty="0">
+                <a:latin typeface="Copperplate" panose="02000504000000020004" pitchFamily="2" charset="77"/>
+              </a:rPr>
+              <a:t>DEMO</a:t>
+            </a:r>
           </a:p>
         </p:txBody>
       </p:sp>
@@ -8239,7 +8247,7 @@
           <p:cNvPr id="3" name="Content Placeholder 2">
             <a:extLst>
               <a:ext uri="{FF2B5EF4-FFF2-40B4-BE49-F238E27FC236}">
-                <a16:creationId xmlns:a16="http://schemas.microsoft.com/office/drawing/2014/main" id="{A65FAB35-CD54-4840-9744-C68CB9750652}"/>
+                <a16:creationId xmlns:a16="http://schemas.microsoft.com/office/drawing/2014/main" id="{00D47165-DCEB-4A48-83CA-4C01DC3F17DC}"/>
               </a:ext>
             </a:extLst>
           </p:cNvPr>
@@ -8252,154 +8260,40 @@
         </p:nvSpPr>
         <p:spPr>
           <a:xfrm>
-            <a:off x="455469" y="2081505"/>
-            <a:ext cx="10877095" cy="4776495"/>
+            <a:off x="680321" y="3536087"/>
+            <a:ext cx="11296820" cy="3599316"/>
           </a:xfrm>
         </p:spPr>
         <p:txBody>
           <a:bodyPr>
-            <a:normAutofit fontScale="92500" lnSpcReduction="10000"/>
+            <a:normAutofit/>
           </a:bodyPr>
           <a:lstStyle/>
           <a:p>
-            <a:pPr>
-              <a:lnSpc>
-                <a:spcPct val="120000"/>
-              </a:lnSpc>
+            <a:pPr marL="0" indent="0">
+              <a:buNone/>
             </a:pPr>
             <a:r>
-              <a:rPr lang="en-US" sz="2000" dirty="0">
-                <a:latin typeface="Copperplate" panose="02000504000000020004" pitchFamily="2" charset="77"/>
-              </a:rPr>
-              <a:t>Brock Gibson: Most of the front end functionality (Firing off the request, filling the list, basic page layout, also typed this document)</a:t>
-            </a:r>
-          </a:p>
-          <a:p>
-            <a:pPr>
-              <a:lnSpc>
-                <a:spcPct val="120000"/>
-              </a:lnSpc>
-            </a:pPr>
-            <a:endParaRPr lang="en-US" sz="2000" dirty="0">
-              <a:latin typeface="Copperplate" panose="02000504000000020004" pitchFamily="2" charset="77"/>
+              <a:rPr lang="en-US" sz="3600" dirty="0">
+                <a:solidFill>
+                  <a:srgbClr val="0070C0"/>
+                </a:solidFill>
+                <a:hlinkClick r:id="rId2"/>
+              </a:rPr>
+              <a:t>https://hackillinois2018-65d9f.firebaseapp.com/</a:t>
+            </a:r>
+            <a:endParaRPr lang="en-US" sz="3600" dirty="0">
+              <a:solidFill>
+                <a:srgbClr val="0070C0"/>
+              </a:solidFill>
             </a:endParaRPr>
-          </a:p>
-          <a:p>
-            <a:pPr>
-              <a:lnSpc>
-                <a:spcPct val="120000"/>
-              </a:lnSpc>
-            </a:pPr>
-            <a:r>
-              <a:rPr lang="en-US" sz="2000" dirty="0">
-                <a:latin typeface="Copperplate" panose="02000504000000020004" pitchFamily="2" charset="77"/>
-              </a:rPr>
-              <a:t>Jordan Liebman: Most of the backend (handling the request to google and returning a JSON response, for a zip code request, and a place details request) also Deployment to Firebase hosting.</a:t>
-            </a:r>
-          </a:p>
-          <a:p>
-            <a:pPr>
-              <a:lnSpc>
-                <a:spcPct val="120000"/>
-              </a:lnSpc>
-            </a:pPr>
-            <a:endParaRPr lang="en-US" sz="2000" dirty="0">
-              <a:latin typeface="Copperplate" panose="02000504000000020004" pitchFamily="2" charset="77"/>
-            </a:endParaRPr>
-          </a:p>
-          <a:p>
-            <a:pPr>
-              <a:lnSpc>
-                <a:spcPct val="120000"/>
-              </a:lnSpc>
-            </a:pPr>
-            <a:r>
-              <a:rPr lang="en-US" sz="2000" dirty="0">
-                <a:latin typeface="Copperplate" panose="02000504000000020004" pitchFamily="2" charset="77"/>
-              </a:rPr>
-              <a:t>Adam Oakes: Created the </a:t>
-            </a:r>
-            <a:r>
-              <a:rPr lang="en-US" sz="2000" dirty="0" err="1">
-                <a:latin typeface="Copperplate" panose="02000504000000020004" pitchFamily="2" charset="77"/>
-              </a:rPr>
-              <a:t>navbar</a:t>
-            </a:r>
-            <a:r>
-              <a:rPr lang="en-US" sz="2000" dirty="0">
-                <a:latin typeface="Copperplate" panose="02000504000000020004" pitchFamily="2" charset="77"/>
-              </a:rPr>
-              <a:t> &amp; handled the auto-location detection functionality; react app &amp; </a:t>
-            </a:r>
-            <a:r>
-              <a:rPr lang="en-US" sz="2000" dirty="0" err="1">
-                <a:latin typeface="Copperplate" panose="02000504000000020004" pitchFamily="2" charset="77"/>
-              </a:rPr>
-              <a:t>php</a:t>
-            </a:r>
-            <a:r>
-              <a:rPr lang="en-US" sz="2000" dirty="0">
-                <a:latin typeface="Copperplate" panose="02000504000000020004" pitchFamily="2" charset="77"/>
-              </a:rPr>
-              <a:t>)</a:t>
-            </a:r>
-          </a:p>
-          <a:p>
-            <a:pPr>
-              <a:lnSpc>
-                <a:spcPct val="120000"/>
-              </a:lnSpc>
-            </a:pPr>
-            <a:endParaRPr lang="en-US" sz="2000" dirty="0">
-              <a:latin typeface="Copperplate" panose="02000504000000020004" pitchFamily="2" charset="77"/>
-            </a:endParaRPr>
-          </a:p>
-          <a:p>
-            <a:pPr>
-              <a:lnSpc>
-                <a:spcPct val="120000"/>
-              </a:lnSpc>
-            </a:pPr>
-            <a:r>
-              <a:rPr lang="en-US" sz="2000" dirty="0">
-                <a:latin typeface="Copperplate" panose="02000504000000020004" pitchFamily="2" charset="77"/>
-              </a:rPr>
-              <a:t>Ali </a:t>
-            </a:r>
-            <a:r>
-              <a:rPr lang="en-US" sz="2000" dirty="0" err="1">
-                <a:latin typeface="Copperplate" panose="02000504000000020004" pitchFamily="2" charset="77"/>
-              </a:rPr>
-              <a:t>Shahmoradi</a:t>
-            </a:r>
-            <a:r>
-              <a:rPr lang="en-US" sz="2000" dirty="0">
-                <a:latin typeface="Copperplate" panose="02000504000000020004" pitchFamily="2" charset="77"/>
-              </a:rPr>
-              <a:t>: Styling Master (styling and making everything look pretty with </a:t>
-            </a:r>
-            <a:r>
-              <a:rPr lang="en-US" sz="2000" dirty="0" err="1">
-                <a:latin typeface="Copperplate" panose="02000504000000020004" pitchFamily="2" charset="77"/>
-              </a:rPr>
-              <a:t>boostrap</a:t>
-            </a:r>
-            <a:r>
-              <a:rPr lang="en-US" sz="2000" dirty="0">
-                <a:latin typeface="Copperplate" panose="02000504000000020004" pitchFamily="2" charset="77"/>
-              </a:rPr>
-              <a:t>. Everyone loves a good looking and functional application)</a:t>
-            </a:r>
-          </a:p>
-          <a:p>
-            <a:endParaRPr lang="en-US" dirty="0"/>
           </a:p>
         </p:txBody>
       </p:sp>
     </p:spTree>
     <p:extLst>
       <p:ext uri="{BB962C8B-B14F-4D97-AF65-F5344CB8AC3E}">
-        <p14:creationId xmlns:p14="http://schemas.microsoft.com/office/powerpoint/2010/main" val="1583792813"/>
+        <p14:creationId xmlns:p14="http://schemas.microsoft.com/office/powerpoint/2010/main" val="3407307679"/>
       </p:ext>
     </p:extLst>
   </p:cSld>
@@ -8431,7 +8325,7 @@
           <p:cNvPr id="2" name="Title 1">
             <a:extLst>
               <a:ext uri="{FF2B5EF4-FFF2-40B4-BE49-F238E27FC236}">
-                <a16:creationId xmlns:a16="http://schemas.microsoft.com/office/drawing/2014/main" id="{FA4FBD93-7E2E-7246-B0CE-F98036C71919}"/>
+                <a16:creationId xmlns:a16="http://schemas.microsoft.com/office/drawing/2014/main" id="{4899B477-AD3F-A043-8B4C-4B51E8182D05}"/>
               </a:ext>
             </a:extLst>
           </p:cNvPr>
@@ -8448,11 +8342,14 @@
           <a:lstStyle/>
           <a:p>
             <a:r>
-              <a:rPr lang="en-US" dirty="0">
-                <a:latin typeface="Copperplate" panose="02000504000000020004" pitchFamily="2" charset="77"/>
-              </a:rPr>
-              <a:t>DEMO</a:t>
-            </a:r>
+              <a:rPr lang="en-US" b="1" dirty="0">
+                <a:latin typeface="Copperplate" panose="02000504000000020004" pitchFamily="2" charset="77"/>
+              </a:rPr>
+              <a:t>Tips and Tricks</a:t>
+            </a:r>
+            <a:endParaRPr lang="en-US" dirty="0">
+              <a:latin typeface="Copperplate" panose="02000504000000020004" pitchFamily="2" charset="77"/>
+            </a:endParaRPr>
           </a:p>
         </p:txBody>
       </p:sp>
@@ -8461,7 +8358,7 @@
           <p:cNvPr id="3" name="Content Placeholder 2">
             <a:extLst>
               <a:ext uri="{FF2B5EF4-FFF2-40B4-BE49-F238E27FC236}">
-                <a16:creationId xmlns:a16="http://schemas.microsoft.com/office/drawing/2014/main" id="{00D47165-DCEB-4A48-83CA-4C01DC3F17DC}"/>
+                <a16:creationId xmlns:a16="http://schemas.microsoft.com/office/drawing/2014/main" id="{CE7D7E25-3AF8-F242-9288-846DF3CA62D0}"/>
               </a:ext>
             </a:extLst>
           </p:cNvPr>
@@ -8474,8 +8371,8 @@
         </p:nvSpPr>
         <p:spPr>
           <a:xfrm>
-            <a:off x="680321" y="3536087"/>
-            <a:ext cx="11296820" cy="3599316"/>
+            <a:off x="680321" y="2098624"/>
+            <a:ext cx="10217528" cy="4557010"/>
           </a:xfrm>
         </p:spPr>
         <p:txBody>
@@ -8484,30 +8381,75 @@
           </a:bodyPr>
           <a:lstStyle/>
           <a:p>
-            <a:pPr marL="0" indent="0">
-              <a:buNone/>
-            </a:pPr>
-            <a:r>
-              <a:rPr lang="en-US" sz="3600" dirty="0">
-                <a:solidFill>
-                  <a:srgbClr val="0070C0"/>
-                </a:solidFill>
-                <a:hlinkClick r:id="rId2"/>
-              </a:rPr>
-              <a:t>https://hackillinois2018-65d9f.firebaseapp.com/</a:t>
-            </a:r>
-            <a:endParaRPr lang="en-US" sz="3600" dirty="0">
-              <a:solidFill>
-                <a:srgbClr val="0070C0"/>
-              </a:solidFill>
+            <a:r>
+              <a:rPr lang="en-US" dirty="0">
+                <a:latin typeface="Copperplate" panose="02000504000000020004" pitchFamily="2" charset="77"/>
+              </a:rPr>
+              <a:t>Deployment: Firebase is the way to go to get a simple app up and running super quickly, and most importantly, secure(HTTPS) and free.</a:t>
+            </a:r>
+          </a:p>
+          <a:p>
+            <a:endParaRPr lang="en-US" dirty="0">
+              <a:latin typeface="Copperplate" panose="02000504000000020004" pitchFamily="2" charset="77"/>
             </a:endParaRPr>
+          </a:p>
+          <a:p>
+            <a:r>
+              <a:rPr lang="en-US" dirty="0">
+                <a:latin typeface="Copperplate" panose="02000504000000020004" pitchFamily="2" charset="77"/>
+              </a:rPr>
+              <a:t>React is here to stay, so I'd learn it. </a:t>
+            </a:r>
+          </a:p>
+          <a:p>
+            <a:pPr lvl="1"/>
+            <a:r>
+              <a:rPr lang="en-US" dirty="0">
+                <a:latin typeface="Copperplate" panose="02000504000000020004" pitchFamily="2" charset="77"/>
+              </a:rPr>
+              <a:t>It is one of the biggest repos and most used modern frameworks, but also has one of the smallest ratios of issues, which means they are resolved quickly. It is managed well, and updated  constantly.</a:t>
+            </a:r>
+          </a:p>
+          <a:p>
+            <a:pPr lvl="2"/>
+            <a:r>
+              <a:rPr lang="en-US" dirty="0">
+                <a:latin typeface="Copperplate" panose="02000504000000020004" pitchFamily="2" charset="77"/>
+              </a:rPr>
+              <a:t>angular has over 2,200 open issue requests, </a:t>
+            </a:r>
+          </a:p>
+          <a:p>
+            <a:pPr lvl="2"/>
+            <a:r>
+              <a:rPr lang="en-US" dirty="0">
+                <a:latin typeface="Copperplate" panose="02000504000000020004" pitchFamily="2" charset="77"/>
+              </a:rPr>
+              <a:t>react is around 350.</a:t>
+            </a:r>
+          </a:p>
+          <a:p>
+            <a:endParaRPr lang="en-US" dirty="0">
+              <a:latin typeface="Copperplate" panose="02000504000000020004" pitchFamily="2" charset="77"/>
+            </a:endParaRPr>
+          </a:p>
+          <a:p>
+            <a:r>
+              <a:rPr lang="en-US" dirty="0">
+                <a:latin typeface="Copperplate" panose="02000504000000020004" pitchFamily="2" charset="77"/>
+              </a:rPr>
+              <a:t>P.S: Don't work on master kids!</a:t>
+            </a:r>
+          </a:p>
+          <a:p>
+            <a:endParaRPr lang="en-US" dirty="0"/>
           </a:p>
         </p:txBody>
       </p:sp>
     </p:spTree>
     <p:extLst>
       <p:ext uri="{BB962C8B-B14F-4D97-AF65-F5344CB8AC3E}">
-        <p14:creationId xmlns:p14="http://schemas.microsoft.com/office/powerpoint/2010/main" val="3407307679"/>
+        <p14:creationId xmlns:p14="http://schemas.microsoft.com/office/powerpoint/2010/main" val="1995203212"/>
       </p:ext>
     </p:extLst>
   </p:cSld>
@@ -8539,7 +8481,7 @@
           <p:cNvPr id="2" name="Title 1">
             <a:extLst>
               <a:ext uri="{FF2B5EF4-FFF2-40B4-BE49-F238E27FC236}">
-                <a16:creationId xmlns:a16="http://schemas.microsoft.com/office/drawing/2014/main" id="{4899B477-AD3F-A043-8B4C-4B51E8182D05}"/>
+                <a16:creationId xmlns:a16="http://schemas.microsoft.com/office/drawing/2014/main" id="{D1E8A1DE-D804-4747-AF77-DB63D8B4AF64}"/>
               </a:ext>
             </a:extLst>
           </p:cNvPr>
@@ -8559,7 +8501,7 @@
               <a:rPr lang="en-US" b="1" dirty="0">
                 <a:latin typeface="Copperplate" panose="02000504000000020004" pitchFamily="2" charset="77"/>
               </a:rPr>
-              <a:t>Tips and Tricks</a:t>
+              <a:t>The Future:</a:t>
             </a:r>
             <a:endParaRPr lang="en-US" dirty="0">
               <a:latin typeface="Copperplate" panose="02000504000000020004" pitchFamily="2" charset="77"/>
@@ -8572,7 +8514,7 @@
           <p:cNvPr id="3" name="Content Placeholder 2">
             <a:extLst>
               <a:ext uri="{FF2B5EF4-FFF2-40B4-BE49-F238E27FC236}">
-                <a16:creationId xmlns:a16="http://schemas.microsoft.com/office/drawing/2014/main" id="{CE7D7E25-3AF8-F242-9288-846DF3CA62D0}"/>
+                <a16:creationId xmlns:a16="http://schemas.microsoft.com/office/drawing/2014/main" id="{2D8CE775-DF0F-534F-A67D-53BBEB841E68}"/>
               </a:ext>
             </a:extLst>
           </p:cNvPr>
@@ -8585,8 +8527,8 @@
         </p:nvSpPr>
         <p:spPr>
           <a:xfrm>
-            <a:off x="680321" y="2098624"/>
-            <a:ext cx="10217528" cy="4557010"/>
+            <a:off x="680321" y="2201961"/>
+            <a:ext cx="10637253" cy="4168858"/>
           </a:xfrm>
         </p:spPr>
         <p:txBody>
@@ -8599,10 +8541,41 @@
               <a:rPr lang="en-US" dirty="0">
                 <a:latin typeface="Copperplate" panose="02000504000000020004" pitchFamily="2" charset="77"/>
               </a:rPr>
-              <a:t>Deployment: Firebase is the way to go to get a simple app up and running super quickly, and most importantly, secure(HTTPS) and free.</a:t>
-            </a:r>
-          </a:p>
-          <a:p>
+              <a:t>Unfinished work</a:t>
+            </a:r>
+          </a:p>
+          <a:p>
+            <a:pPr lvl="1"/>
+            <a:r>
+              <a:rPr lang="en-US" dirty="0">
+                <a:latin typeface="Copperplate" panose="02000504000000020004" pitchFamily="2" charset="77"/>
+              </a:rPr>
+              <a:t>We would like to have working navigation in a good looking  navbar.</a:t>
+            </a:r>
+          </a:p>
+          <a:p>
+            <a:pPr lvl="1"/>
+            <a:r>
+              <a:rPr lang="en-US" dirty="0">
+                <a:latin typeface="Copperplate" panose="02000504000000020004" pitchFamily="2" charset="77"/>
+              </a:rPr>
+              <a:t>Photo references are returned in the JSON but photos were not Implemented in the front end.</a:t>
+            </a:r>
+          </a:p>
+          <a:p>
+            <a:pPr lvl="1"/>
+            <a:r>
+              <a:rPr lang="en-US" dirty="0">
+                <a:latin typeface="Copperplate" panose="02000504000000020004" pitchFamily="2" charset="77"/>
+              </a:rPr>
+              <a:t>(pull up postman to look at JSON responses &amp; </a:t>
+            </a:r>
+            <a:r>
+              <a:rPr lang="en-US">
+                <a:latin typeface="Copperplate" panose="02000504000000020004" pitchFamily="2" charset="77"/>
+              </a:rPr>
+              <a:t>photo responses)</a:t>
+            </a:r>
             <a:endParaRPr lang="en-US" dirty="0">
               <a:latin typeface="Copperplate" panose="02000504000000020004" pitchFamily="2" charset="77"/>
             </a:endParaRPr>
@@ -8612,7 +8585,7 @@
               <a:rPr lang="en-US" dirty="0">
                 <a:latin typeface="Copperplate" panose="02000504000000020004" pitchFamily="2" charset="77"/>
               </a:rPr>
-              <a:t>React is here to stay, so I'd learn it. </a:t>
+              <a:t>Further Ideas</a:t>
             </a:r>
           </a:p>
           <a:p>
@@ -8621,49 +8594,21 @@
               <a:rPr lang="en-US" dirty="0">
                 <a:latin typeface="Copperplate" panose="02000504000000020004" pitchFamily="2" charset="77"/>
               </a:rPr>
-              <a:t>It is one of the biggest repos and most used modern frameworks, but also has one of the smallest ratios of issues, which means they are resolved quickly. It is managed well, and updated  constantly.</a:t>
-            </a:r>
-          </a:p>
-          <a:p>
-            <a:pPr lvl="2"/>
-            <a:r>
-              <a:rPr lang="en-US" dirty="0">
-                <a:latin typeface="Copperplate" panose="02000504000000020004" pitchFamily="2" charset="77"/>
-              </a:rPr>
-              <a:t>angular has over 2,200 open issue requests, </a:t>
-            </a:r>
-          </a:p>
-          <a:p>
-            <a:pPr lvl="2"/>
-            <a:r>
-              <a:rPr lang="en-US" dirty="0">
-                <a:latin typeface="Copperplate" panose="02000504000000020004" pitchFamily="2" charset="77"/>
-              </a:rPr>
-              <a:t>react is around 350.</a:t>
-            </a:r>
-          </a:p>
-          <a:p>
+              <a:t>implement an actual map with pins of the pizza places in your area. Doing it that way would allow you to visually see the location, as well as a list.</a:t>
+            </a:r>
+          </a:p>
+          <a:p>
+            <a:pPr lvl="1"/>
             <a:endParaRPr lang="en-US" dirty="0">
               <a:latin typeface="Copperplate" panose="02000504000000020004" pitchFamily="2" charset="77"/>
             </a:endParaRPr>
           </a:p>
-          <a:p>
-            <a:r>
-              <a:rPr lang="en-US" dirty="0">
-                <a:latin typeface="Copperplate" panose="02000504000000020004" pitchFamily="2" charset="77"/>
-              </a:rPr>
-              <a:t>P.S: Don't work on master kids!</a:t>
-            </a:r>
-          </a:p>
-          <a:p>
-            <a:endParaRPr lang="en-US" dirty="0"/>
-          </a:p>
         </p:txBody>
       </p:sp>
     </p:spTree>
     <p:extLst>
       <p:ext uri="{BB962C8B-B14F-4D97-AF65-F5344CB8AC3E}">
-        <p14:creationId xmlns:p14="http://schemas.microsoft.com/office/powerpoint/2010/main" val="1995203212"/>
+        <p14:creationId xmlns:p14="http://schemas.microsoft.com/office/powerpoint/2010/main" val="284935561"/>
       </p:ext>
     </p:extLst>
   </p:cSld>
@@ -8695,165 +8640,6 @@
           <p:cNvPr id="2" name="Title 1">
             <a:extLst>
               <a:ext uri="{FF2B5EF4-FFF2-40B4-BE49-F238E27FC236}">
-                <a16:creationId xmlns:a16="http://schemas.microsoft.com/office/drawing/2014/main" id="{D1E8A1DE-D804-4747-AF77-DB63D8B4AF64}"/>
-              </a:ext>
-            </a:extLst>
-          </p:cNvPr>
-          <p:cNvSpPr>
-            <a:spLocks noGrp="1"/>
-          </p:cNvSpPr>
-          <p:nvPr>
-            <p:ph type="title"/>
-          </p:nvPr>
-        </p:nvSpPr>
-        <p:spPr/>
-        <p:txBody>
-          <a:bodyPr/>
-          <a:lstStyle/>
-          <a:p>
-            <a:r>
-              <a:rPr lang="en-US" b="1" dirty="0">
-                <a:latin typeface="Copperplate" panose="02000504000000020004" pitchFamily="2" charset="77"/>
-              </a:rPr>
-              <a:t>The Future:</a:t>
-            </a:r>
-            <a:endParaRPr lang="en-US" dirty="0">
-              <a:latin typeface="Copperplate" panose="02000504000000020004" pitchFamily="2" charset="77"/>
-            </a:endParaRPr>
-          </a:p>
-        </p:txBody>
-      </p:sp>
-      <p:sp>
-        <p:nvSpPr>
-          <p:cNvPr id="3" name="Content Placeholder 2">
-            <a:extLst>
-              <a:ext uri="{FF2B5EF4-FFF2-40B4-BE49-F238E27FC236}">
-                <a16:creationId xmlns:a16="http://schemas.microsoft.com/office/drawing/2014/main" id="{2D8CE775-DF0F-534F-A67D-53BBEB841E68}"/>
-              </a:ext>
-            </a:extLst>
-          </p:cNvPr>
-          <p:cNvSpPr>
-            <a:spLocks noGrp="1"/>
-          </p:cNvSpPr>
-          <p:nvPr>
-            <p:ph idx="1"/>
-          </p:nvPr>
-        </p:nvSpPr>
-        <p:spPr>
-          <a:xfrm>
-            <a:off x="680321" y="2201961"/>
-            <a:ext cx="10637253" cy="4168858"/>
-          </a:xfrm>
-        </p:spPr>
-        <p:txBody>
-          <a:bodyPr>
-            <a:normAutofit/>
-          </a:bodyPr>
-          <a:lstStyle/>
-          <a:p>
-            <a:r>
-              <a:rPr lang="en-US" dirty="0">
-                <a:latin typeface="Copperplate" panose="02000504000000020004" pitchFamily="2" charset="77"/>
-              </a:rPr>
-              <a:t>Unfinished work</a:t>
-            </a:r>
-          </a:p>
-          <a:p>
-            <a:pPr lvl="1"/>
-            <a:r>
-              <a:rPr lang="en-US" dirty="0">
-                <a:latin typeface="Copperplate" panose="02000504000000020004" pitchFamily="2" charset="77"/>
-              </a:rPr>
-              <a:t>We would like to have working navigation in a good looking  navbar.</a:t>
-            </a:r>
-          </a:p>
-          <a:p>
-            <a:pPr lvl="1"/>
-            <a:r>
-              <a:rPr lang="en-US" dirty="0">
-                <a:latin typeface="Copperplate" panose="02000504000000020004" pitchFamily="2" charset="77"/>
-              </a:rPr>
-              <a:t>Photo references are returned in the JSON but photos were not Implemented in the front end.</a:t>
-            </a:r>
-          </a:p>
-          <a:p>
-            <a:pPr lvl="1"/>
-            <a:r>
-              <a:rPr lang="en-US" dirty="0">
-                <a:latin typeface="Copperplate" panose="02000504000000020004" pitchFamily="2" charset="77"/>
-              </a:rPr>
-              <a:t>(pull up postman to look at JSON responses &amp; </a:t>
-            </a:r>
-            <a:r>
-              <a:rPr lang="en-US">
-                <a:latin typeface="Copperplate" panose="02000504000000020004" pitchFamily="2" charset="77"/>
-              </a:rPr>
-              <a:t>photo responses)</a:t>
-            </a:r>
-            <a:endParaRPr lang="en-US" dirty="0">
-              <a:latin typeface="Copperplate" panose="02000504000000020004" pitchFamily="2" charset="77"/>
-            </a:endParaRPr>
-          </a:p>
-          <a:p>
-            <a:r>
-              <a:rPr lang="en-US" dirty="0">
-                <a:latin typeface="Copperplate" panose="02000504000000020004" pitchFamily="2" charset="77"/>
-              </a:rPr>
-              <a:t>Further Ideas</a:t>
-            </a:r>
-          </a:p>
-          <a:p>
-            <a:pPr lvl="1"/>
-            <a:r>
-              <a:rPr lang="en-US" dirty="0">
-                <a:latin typeface="Copperplate" panose="02000504000000020004" pitchFamily="2" charset="77"/>
-              </a:rPr>
-              <a:t>implement an actual map with pins of the pizza places in your area. Doing it that way would allow you to visually see the location, as well as a list.</a:t>
-            </a:r>
-          </a:p>
-          <a:p>
-            <a:pPr lvl="1"/>
-            <a:endParaRPr lang="en-US" dirty="0">
-              <a:latin typeface="Copperplate" panose="02000504000000020004" pitchFamily="2" charset="77"/>
-            </a:endParaRPr>
-          </a:p>
-        </p:txBody>
-      </p:sp>
-    </p:spTree>
-    <p:extLst>
-      <p:ext uri="{BB962C8B-B14F-4D97-AF65-F5344CB8AC3E}">
-        <p14:creationId xmlns:p14="http://schemas.microsoft.com/office/powerpoint/2010/main" val="284935561"/>
-      </p:ext>
-    </p:extLst>
-  </p:cSld>
-  <p:clrMapOvr>
-    <a:masterClrMapping/>
-  </p:clrMapOvr>
-</p:sld>
-</file>
-
-<file path=ppt/slides/slide17.xml><?xml version="1.0" encoding="utf-8"?>
-<p:sld xmlns:a="http://schemas.openxmlformats.org/drawingml/2006/main" xmlns:r="http://schemas.openxmlformats.org/officeDocument/2006/relationships" xmlns:p="http://schemas.openxmlformats.org/presentationml/2006/main">
-  <p:cSld>
-    <p:spTree>
-      <p:nvGrpSpPr>
-        <p:cNvPr id="1" name=""/>
-        <p:cNvGrpSpPr/>
-        <p:nvPr/>
-      </p:nvGrpSpPr>
-      <p:grpSpPr>
-        <a:xfrm>
-          <a:off x="0" y="0"/>
-          <a:ext cx="0" cy="0"/>
-          <a:chOff x="0" y="0"/>
-          <a:chExt cx="0" cy="0"/>
-        </a:xfrm>
-      </p:grpSpPr>
-      <p:sp>
-        <p:nvSpPr>
-          <p:cNvPr id="2" name="Title 1">
-            <a:extLst>
-              <a:ext uri="{FF2B5EF4-FFF2-40B4-BE49-F238E27FC236}">
                 <a16:creationId xmlns:a16="http://schemas.microsoft.com/office/drawing/2014/main" id="{A3B3ABBC-2015-6C4E-A485-6280E16B692E}"/>
               </a:ext>
             </a:extLst>
@@ -8909,119 +8695,16 @@
           <a:p>
             <a:pPr marL="0" indent="0">
               <a:lnSpc>
-                <a:spcPct val="150000"/>
+                <a:spcPct val="200000"/>
               </a:lnSpc>
               <a:buNone/>
             </a:pPr>
             <a:r>
-              <a:rPr lang="en-US" sz="2800" dirty="0">
+              <a:rPr lang="en-US" sz="3200" dirty="0">
                 <a:latin typeface="Copperplate" panose="02000504000000020004" pitchFamily="2" charset="77"/>
               </a:rPr>
               <a:t>FRONTEND GIT: </a:t>
             </a:r>
-          </a:p>
-          <a:p>
-            <a:pPr marL="457200" lvl="1" indent="0">
-              <a:lnSpc>
-                <a:spcPct val="150000"/>
-              </a:lnSpc>
-              <a:buNone/>
-            </a:pPr>
-            <a:r>
-              <a:rPr lang="en-US" sz="2400" dirty="0">
-                <a:latin typeface="Copperplate" panose="02000504000000020004" pitchFamily="2" charset="77"/>
-                <a:hlinkClick r:id="rId2"/>
-              </a:rPr>
-              <a:t>https://github.com/Brockerboy/Pizza-Now</a:t>
-            </a:r>
-            <a:endParaRPr lang="en-US" sz="2400" dirty="0">
-              <a:latin typeface="Copperplate" panose="02000504000000020004" pitchFamily="2" charset="77"/>
-            </a:endParaRPr>
-          </a:p>
-          <a:p>
-            <a:pPr marL="0" indent="0">
-              <a:lnSpc>
-                <a:spcPct val="150000"/>
-              </a:lnSpc>
-              <a:buNone/>
-            </a:pPr>
-            <a:r>
-              <a:rPr lang="en-US" sz="2800" dirty="0">
-                <a:latin typeface="Copperplate" panose="02000504000000020004" pitchFamily="2" charset="77"/>
-              </a:rPr>
-              <a:t>BACKEND GIT: </a:t>
-            </a:r>
-          </a:p>
-          <a:p>
-            <a:pPr marL="457200" lvl="1" indent="0">
-              <a:lnSpc>
-                <a:spcPct val="150000"/>
-              </a:lnSpc>
-              <a:buNone/>
-            </a:pPr>
-            <a:r>
-              <a:rPr lang="en-US" sz="2400" dirty="0">
-                <a:latin typeface="Copperplate" panose="02000504000000020004" pitchFamily="2" charset="77"/>
-                <a:hlinkClick r:id="rId3"/>
-              </a:rPr>
-              <a:t>https://github.com/jordan329/hackweek</a:t>
-            </a:r>
-            <a:endParaRPr lang="en-US" sz="2800" dirty="0">
-              <a:latin typeface="Copperplate" panose="02000504000000020004" pitchFamily="2" charset="77"/>
-            </a:endParaRPr>
-          </a:p>
-          <a:p>
-            <a:pPr marL="0" indent="0">
-              <a:lnSpc>
-                <a:spcPct val="150000"/>
-              </a:lnSpc>
-              <a:buNone/>
-            </a:pPr>
-            <a:r>
-              <a:rPr lang="en-US" sz="2800" dirty="0">
-                <a:latin typeface="Copperplate" panose="02000504000000020004" pitchFamily="2" charset="77"/>
-              </a:rPr>
-              <a:t>PHP GIT:</a:t>
-            </a:r>
-          </a:p>
-          <a:p>
-            <a:pPr marL="457200" lvl="1" indent="0">
-              <a:lnSpc>
-                <a:spcPct val="150000"/>
-              </a:lnSpc>
-              <a:buNone/>
-            </a:pPr>
-            <a:r>
-              <a:rPr lang="en-US" sz="2400" u="sng" dirty="0">
-                <a:latin typeface="Copperplate" panose="02000504000000020004" pitchFamily="2" charset="77"/>
-                <a:hlinkClick r:id="rId4"/>
-              </a:rPr>
-              <a:t>https://</a:t>
-            </a:r>
-            <a:r>
-              <a:rPr lang="en-US" sz="2400" u="sng" dirty="0" err="1">
-                <a:latin typeface="Copperplate" panose="02000504000000020004" pitchFamily="2" charset="77"/>
-                <a:hlinkClick r:id="rId4"/>
-              </a:rPr>
-              <a:t>github.com</a:t>
-            </a:r>
-            <a:r>
-              <a:rPr lang="en-US" sz="2400" u="sng" dirty="0">
-                <a:latin typeface="Copperplate" panose="02000504000000020004" pitchFamily="2" charset="77"/>
-                <a:hlinkClick r:id="rId4"/>
-              </a:rPr>
-              <a:t>/amot92/</a:t>
-            </a:r>
-            <a:r>
-              <a:rPr lang="en-US" sz="2400" u="sng" dirty="0" err="1">
-                <a:latin typeface="Copperplate" panose="02000504000000020004" pitchFamily="2" charset="77"/>
-                <a:hlinkClick r:id="rId4"/>
-              </a:rPr>
-              <a:t>coordsToZipAPI</a:t>
-            </a:r>
-            <a:endParaRPr lang="en-US" sz="2400" u="sng" dirty="0">
-              <a:latin typeface="Copperplate" panose="02000504000000020004" pitchFamily="2" charset="77"/>
-            </a:endParaRPr>
           </a:p>
           <a:p>
             <a:pPr marL="457200" lvl="1" indent="0">
@@ -9030,15 +8713,48 @@
               </a:lnSpc>
               <a:buNone/>
             </a:pPr>
+            <a:r>
+              <a:rPr lang="en-US" sz="2800" dirty="0">
+                <a:latin typeface="Copperplate" panose="02000504000000020004" pitchFamily="2" charset="77"/>
+                <a:hlinkClick r:id="rId2"/>
+              </a:rPr>
+              <a:t>https://github.com/Brockerboy/Pizza-Now</a:t>
+            </a:r>
             <a:endParaRPr lang="en-US" sz="2800" dirty="0">
               <a:latin typeface="Copperplate" panose="02000504000000020004" pitchFamily="2" charset="77"/>
             </a:endParaRPr>
           </a:p>
           <a:p>
             <a:pPr marL="0" indent="0">
+              <a:lnSpc>
+                <a:spcPct val="200000"/>
+              </a:lnSpc>
               <a:buNone/>
             </a:pPr>
-            <a:endParaRPr lang="en-US" dirty="0"/>
+            <a:r>
+              <a:rPr lang="en-US" sz="3200" dirty="0">
+                <a:latin typeface="Copperplate" panose="02000504000000020004" pitchFamily="2" charset="77"/>
+              </a:rPr>
+              <a:t>BACKEND GIT: </a:t>
+            </a:r>
+          </a:p>
+          <a:p>
+            <a:pPr marL="457200" lvl="1" indent="0">
+              <a:lnSpc>
+                <a:spcPct val="200000"/>
+              </a:lnSpc>
+              <a:buNone/>
+            </a:pPr>
+            <a:r>
+              <a:rPr lang="en-US" sz="2800" dirty="0">
+                <a:latin typeface="Copperplate" panose="02000504000000020004" pitchFamily="2" charset="77"/>
+                <a:hlinkClick r:id="rId3"/>
+              </a:rPr>
+              <a:t>https://github.com/jordan329/hackweek</a:t>
+            </a:r>
+            <a:endParaRPr lang="en-US" sz="3200" dirty="0">
+              <a:latin typeface="Copperplate" panose="02000504000000020004" pitchFamily="2" charset="77"/>
+            </a:endParaRPr>
           </a:p>
         </p:txBody>
       </p:sp>
@@ -9938,19 +9654,6 @@
             </a:r>
           </a:p>
           <a:p>
-            <a:pPr marL="342900" indent="-342900">
-              <a:lnSpc>
-                <a:spcPct val="200000"/>
-              </a:lnSpc>
-            </a:pPr>
-            <a:r>
-              <a:rPr lang="en-US" sz="2600" dirty="0">
-                <a:latin typeface="Copperplate" panose="02000504000000020004" pitchFamily="2" charset="77"/>
-              </a:rPr>
-              <a:t>PHP</a:t>
-            </a:r>
-          </a:p>
-          <a:p>
             <a:pPr>
               <a:lnSpc>
                 <a:spcPct val="200000"/>
@@ -10309,15 +10012,38 @@
           </a:bodyPr>
           <a:lstStyle/>
           <a:p>
-            <a:pPr marL="0" indent="0" algn="ctr">
-              <a:buNone/>
-            </a:pPr>
-            <a:r>
-              <a:rPr lang="en-US" sz="3600" dirty="0">
+            <a:r>
+              <a:rPr lang="en-US" sz="2800" dirty="0">
                 <a:latin typeface="Copperplate" panose="02000504000000020004" pitchFamily="2" charset="77"/>
               </a:rPr>
               <a:t>Google Maps API was used to retrieve all the data about the pizza places within a certain zip code area, then select a single place and get more information about it. JSON is returned for use in our React application.</a:t>
             </a:r>
+          </a:p>
+          <a:p>
+            <a:r>
+              <a:rPr lang="en-US" sz="2800" dirty="0">
+                <a:latin typeface="Copperplate" panose="02000504000000020004" pitchFamily="2" charset="77"/>
+              </a:rPr>
+              <a:t>User’s Coordinates sent to Google Reverse-Geolocation API. Address information returned as </a:t>
+            </a:r>
+            <a:r>
+              <a:rPr lang="en-US" sz="2800" dirty="0" err="1">
+                <a:latin typeface="Copperplate" panose="02000504000000020004" pitchFamily="2" charset="77"/>
+              </a:rPr>
+              <a:t>json</a:t>
+            </a:r>
+            <a:r>
+              <a:rPr lang="en-US" sz="2800" dirty="0">
+                <a:latin typeface="Copperplate" panose="02000504000000020004" pitchFamily="2" charset="77"/>
+              </a:rPr>
+              <a:t>. Zip code is extracted and placed in input.</a:t>
+            </a:r>
+          </a:p>
+          <a:p>
+            <a:pPr algn="ctr"/>
+            <a:endParaRPr lang="en-US" sz="3600" dirty="0">
+              <a:latin typeface="Copperplate" panose="02000504000000020004" pitchFamily="2" charset="77"/>
+            </a:endParaRPr>
           </a:p>
           <a:p>
             <a:endParaRPr lang="en-US" dirty="0"/>

</xml_diff>